<commit_message>
Updated Week 2 Slides
</commit_message>
<xml_diff>
--- a/Week2/Week2_Slides.pptx
+++ b/Week2/Week2_Slides.pptx
@@ -15,7 +15,13 @@
     <p:sldId id="286" r:id="rId9"/>
     <p:sldId id="287" r:id="rId10"/>
     <p:sldId id="288" r:id="rId11"/>
-    <p:sldId id="289" r:id="rId12"/>
+    <p:sldId id="290" r:id="rId12"/>
+    <p:sldId id="291" r:id="rId13"/>
+    <p:sldId id="294" r:id="rId14"/>
+    <p:sldId id="295" r:id="rId15"/>
+    <p:sldId id="292" r:id="rId16"/>
+    <p:sldId id="293" r:id="rId17"/>
+    <p:sldId id="289" r:id="rId18"/>
   </p:sldIdLst>
   <p:sldSz cx="12192000" cy="6858000"/>
   <p:notesSz cx="6858000" cy="9144000"/>
@@ -269,7 +275,7 @@
           <a:p>
             <a:fld id="{B8CBA91D-CA13-43C7-BDE8-E1CE1C707EA6}" type="datetimeFigureOut">
               <a:rPr lang="en-US" smtClean="0"/>
-              <a:t>2/4/2025</a:t>
+              <a:t>2/13/2025</a:t>
             </a:fld>
             <a:endParaRPr lang="en-US"/>
           </a:p>
@@ -467,7 +473,7 @@
           <a:p>
             <a:fld id="{B8CBA91D-CA13-43C7-BDE8-E1CE1C707EA6}" type="datetimeFigureOut">
               <a:rPr lang="en-US" smtClean="0"/>
-              <a:t>2/4/2025</a:t>
+              <a:t>2/13/2025</a:t>
             </a:fld>
             <a:endParaRPr lang="en-US"/>
           </a:p>
@@ -675,7 +681,7 @@
           <a:p>
             <a:fld id="{B8CBA91D-CA13-43C7-BDE8-E1CE1C707EA6}" type="datetimeFigureOut">
               <a:rPr lang="en-US" smtClean="0"/>
-              <a:t>2/4/2025</a:t>
+              <a:t>2/13/2025</a:t>
             </a:fld>
             <a:endParaRPr lang="en-US"/>
           </a:p>
@@ -873,7 +879,7 @@
           <a:p>
             <a:fld id="{B8CBA91D-CA13-43C7-BDE8-E1CE1C707EA6}" type="datetimeFigureOut">
               <a:rPr lang="en-US" smtClean="0"/>
-              <a:t>2/4/2025</a:t>
+              <a:t>2/13/2025</a:t>
             </a:fld>
             <a:endParaRPr lang="en-US"/>
           </a:p>
@@ -1148,7 +1154,7 @@
           <a:p>
             <a:fld id="{B8CBA91D-CA13-43C7-BDE8-E1CE1C707EA6}" type="datetimeFigureOut">
               <a:rPr lang="en-US" smtClean="0"/>
-              <a:t>2/4/2025</a:t>
+              <a:t>2/13/2025</a:t>
             </a:fld>
             <a:endParaRPr lang="en-US"/>
           </a:p>
@@ -1413,7 +1419,7 @@
           <a:p>
             <a:fld id="{B8CBA91D-CA13-43C7-BDE8-E1CE1C707EA6}" type="datetimeFigureOut">
               <a:rPr lang="en-US" smtClean="0"/>
-              <a:t>2/4/2025</a:t>
+              <a:t>2/13/2025</a:t>
             </a:fld>
             <a:endParaRPr lang="en-US"/>
           </a:p>
@@ -1825,7 +1831,7 @@
           <a:p>
             <a:fld id="{B8CBA91D-CA13-43C7-BDE8-E1CE1C707EA6}" type="datetimeFigureOut">
               <a:rPr lang="en-US" smtClean="0"/>
-              <a:t>2/4/2025</a:t>
+              <a:t>2/13/2025</a:t>
             </a:fld>
             <a:endParaRPr lang="en-US"/>
           </a:p>
@@ -1966,7 +1972,7 @@
           <a:p>
             <a:fld id="{B8CBA91D-CA13-43C7-BDE8-E1CE1C707EA6}" type="datetimeFigureOut">
               <a:rPr lang="en-US" smtClean="0"/>
-              <a:t>2/4/2025</a:t>
+              <a:t>2/13/2025</a:t>
             </a:fld>
             <a:endParaRPr lang="en-US"/>
           </a:p>
@@ -2079,7 +2085,7 @@
           <a:p>
             <a:fld id="{B8CBA91D-CA13-43C7-BDE8-E1CE1C707EA6}" type="datetimeFigureOut">
               <a:rPr lang="en-US" smtClean="0"/>
-              <a:t>2/4/2025</a:t>
+              <a:t>2/13/2025</a:t>
             </a:fld>
             <a:endParaRPr lang="en-US"/>
           </a:p>
@@ -2390,7 +2396,7 @@
           <a:p>
             <a:fld id="{B8CBA91D-CA13-43C7-BDE8-E1CE1C707EA6}" type="datetimeFigureOut">
               <a:rPr lang="en-US" smtClean="0"/>
-              <a:t>2/4/2025</a:t>
+              <a:t>2/13/2025</a:t>
             </a:fld>
             <a:endParaRPr lang="en-US"/>
           </a:p>
@@ -2678,7 +2684,7 @@
           <a:p>
             <a:fld id="{B8CBA91D-CA13-43C7-BDE8-E1CE1C707EA6}" type="datetimeFigureOut">
               <a:rPr lang="en-US" smtClean="0"/>
-              <a:t>2/4/2025</a:t>
+              <a:t>2/13/2025</a:t>
             </a:fld>
             <a:endParaRPr lang="en-US"/>
           </a:p>
@@ -2919,7 +2925,7 @@
           <a:p>
             <a:fld id="{B8CBA91D-CA13-43C7-BDE8-E1CE1C707EA6}" type="datetimeFigureOut">
               <a:rPr lang="en-US" smtClean="0"/>
-              <a:t>2/4/2025</a:t>
+              <a:t>2/13/2025</a:t>
             </a:fld>
             <a:endParaRPr lang="en-US"/>
           </a:p>
@@ -4360,6 +4366,3321 @@
         <p:cNvPr id="1" name="">
           <a:extLst>
             <a:ext uri="{FF2B5EF4-FFF2-40B4-BE49-F238E27FC236}">
+              <a16:creationId xmlns:a16="http://schemas.microsoft.com/office/drawing/2014/main" id="{9ED62F4C-79A2-091B-9621-0C86FAFDD1C0}"/>
+            </a:ext>
+          </a:extLst>
+        </p:cNvPr>
+        <p:cNvGrpSpPr/>
+        <p:nvPr/>
+      </p:nvGrpSpPr>
+      <p:grpSpPr>
+        <a:xfrm>
+          <a:off x="0" y="0"/>
+          <a:ext cx="0" cy="0"/>
+          <a:chOff x="0" y="0"/>
+          <a:chExt cx="0" cy="0"/>
+        </a:xfrm>
+      </p:grpSpPr>
+      <p:sp useBgFill="1">
+        <p:nvSpPr>
+          <p:cNvPr id="10" name="Rectangle 9">
+            <a:extLst>
+              <a:ext uri="{FF2B5EF4-FFF2-40B4-BE49-F238E27FC236}">
+                <a16:creationId xmlns:a16="http://schemas.microsoft.com/office/drawing/2014/main" id="{7AF7C8ED-8593-CE69-0F92-194E9471A843}"/>
+              </a:ext>
+              <a:ext uri="{C183D7F6-B498-43B3-948B-1728B52AA6E4}">
+                <adec:decorative xmlns:adec="http://schemas.microsoft.com/office/drawing/2017/decorative" val="1"/>
+              </a:ext>
+            </a:extLst>
+          </p:cNvPr>
+          <p:cNvSpPr>
+            <a:spLocks noGrp="1" noRot="1" noChangeAspect="1" noMove="1" noResize="1" noEditPoints="1" noAdjustHandles="1" noChangeArrowheads="1" noChangeShapeType="1" noTextEdit="1"/>
+          </p:cNvSpPr>
+          <p:nvPr>
+            <p:extLst>
+              <p:ext uri="{386F3935-93C4-4BCD-93E2-E3B085C9AB24}">
+                <p16:designElem xmlns:p16="http://schemas.microsoft.com/office/powerpoint/2015/main" val="1"/>
+              </p:ext>
+            </p:extLst>
+          </p:nvPr>
+        </p:nvSpPr>
+        <p:spPr>
+          <a:xfrm>
+            <a:off x="0" y="0"/>
+            <a:ext cx="12188952" cy="6858000"/>
+          </a:xfrm>
+          <a:prstGeom prst="rect">
+            <a:avLst/>
+          </a:prstGeom>
+          <a:ln>
+            <a:noFill/>
+          </a:ln>
+        </p:spPr>
+        <p:style>
+          <a:lnRef idx="2">
+            <a:schemeClr val="accent1">
+              <a:shade val="50000"/>
+            </a:schemeClr>
+          </a:lnRef>
+          <a:fillRef idx="1">
+            <a:schemeClr val="accent1"/>
+          </a:fillRef>
+          <a:effectRef idx="0">
+            <a:schemeClr val="accent1"/>
+          </a:effectRef>
+          <a:fontRef idx="minor">
+            <a:schemeClr val="lt1"/>
+          </a:fontRef>
+        </p:style>
+        <p:txBody>
+          <a:bodyPr rtlCol="0" anchor="ctr"/>
+          <a:lstStyle/>
+          <a:p>
+            <a:pPr algn="ctr"/>
+            <a:endParaRPr lang="en-US"/>
+          </a:p>
+        </p:txBody>
+      </p:sp>
+      <p:sp>
+        <p:nvSpPr>
+          <p:cNvPr id="6" name="TextBox 5">
+            <a:extLst>
+              <a:ext uri="{FF2B5EF4-FFF2-40B4-BE49-F238E27FC236}">
+                <a16:creationId xmlns:a16="http://schemas.microsoft.com/office/drawing/2014/main" id="{E0AC60BF-2672-3BA1-E7EF-B685E5BD77C8}"/>
+              </a:ext>
+            </a:extLst>
+          </p:cNvPr>
+          <p:cNvSpPr txBox="1"/>
+          <p:nvPr/>
+        </p:nvSpPr>
+        <p:spPr>
+          <a:xfrm>
+            <a:off x="815825" y="426681"/>
+            <a:ext cx="8118625" cy="830997"/>
+          </a:xfrm>
+          <a:prstGeom prst="rect">
+            <a:avLst/>
+          </a:prstGeom>
+          <a:noFill/>
+        </p:spPr>
+        <p:txBody>
+          <a:bodyPr wrap="square" rtlCol="0">
+            <a:spAutoFit/>
+          </a:bodyPr>
+          <a:lstStyle/>
+          <a:p>
+            <a:r>
+              <a:rPr lang="en-US" sz="4800" dirty="0">
+                <a:solidFill>
+                  <a:schemeClr val="accent2"/>
+                </a:solidFill>
+                <a:latin typeface="Roboto Black" panose="02000000000000000000" pitchFamily="2" charset="0"/>
+                <a:ea typeface="Roboto Black" panose="02000000000000000000" pitchFamily="2" charset="0"/>
+              </a:rPr>
+              <a:t>LinkedList&lt;T&gt;</a:t>
+            </a:r>
+          </a:p>
+        </p:txBody>
+      </p:sp>
+      <p:sp>
+        <p:nvSpPr>
+          <p:cNvPr id="7" name="TextBox 6">
+            <a:extLst>
+              <a:ext uri="{FF2B5EF4-FFF2-40B4-BE49-F238E27FC236}">
+                <a16:creationId xmlns:a16="http://schemas.microsoft.com/office/drawing/2014/main" id="{107187E5-4DD7-A764-4C06-26B6FE066A7D}"/>
+              </a:ext>
+            </a:extLst>
+          </p:cNvPr>
+          <p:cNvSpPr txBox="1"/>
+          <p:nvPr/>
+        </p:nvSpPr>
+        <p:spPr>
+          <a:xfrm>
+            <a:off x="815825" y="1244892"/>
+            <a:ext cx="10604500" cy="3046988"/>
+          </a:xfrm>
+          <a:prstGeom prst="rect">
+            <a:avLst/>
+          </a:prstGeom>
+          <a:noFill/>
+        </p:spPr>
+        <p:txBody>
+          <a:bodyPr wrap="square" rtlCol="0">
+            <a:spAutoFit/>
+          </a:bodyPr>
+          <a:lstStyle/>
+          <a:p>
+            <a:r>
+              <a:rPr lang="en-US" sz="1600" dirty="0">
+                <a:latin typeface="-apple-system"/>
+                <a:ea typeface="Roboto" panose="02000000000000000000" pitchFamily="2" charset="0"/>
+              </a:rPr>
+              <a:t>A LinkedList is a way of storing data where </a:t>
+            </a:r>
+            <a:r>
+              <a:rPr lang="en-US" sz="1600" u="sng" dirty="0">
+                <a:solidFill>
+                  <a:schemeClr val="accent5"/>
+                </a:solidFill>
+                <a:latin typeface="-apple-system"/>
+                <a:ea typeface="Roboto" panose="02000000000000000000" pitchFamily="2" charset="0"/>
+              </a:rPr>
+              <a:t>each item (called a node)</a:t>
+            </a:r>
+            <a:r>
+              <a:rPr lang="en-US" sz="1600" dirty="0">
+                <a:latin typeface="-apple-system"/>
+                <a:ea typeface="Roboto" panose="02000000000000000000" pitchFamily="2" charset="0"/>
+              </a:rPr>
+              <a:t> is connected to the next one, like a chain. Each node holds two things:</a:t>
+            </a:r>
+          </a:p>
+          <a:p>
+            <a:pPr marL="342900" indent="-342900">
+              <a:buAutoNum type="arabicPeriod"/>
+            </a:pPr>
+            <a:r>
+              <a:rPr lang="en-US" sz="1600" b="1" dirty="0">
+                <a:latin typeface="-apple-system"/>
+                <a:ea typeface="Roboto" panose="02000000000000000000" pitchFamily="2" charset="0"/>
+              </a:rPr>
+              <a:t>Data</a:t>
+            </a:r>
+            <a:r>
+              <a:rPr lang="en-US" sz="1600" dirty="0">
+                <a:latin typeface="-apple-system"/>
+                <a:ea typeface="Roboto" panose="02000000000000000000" pitchFamily="2" charset="0"/>
+              </a:rPr>
+              <a:t> (the actual value).</a:t>
+            </a:r>
+          </a:p>
+          <a:p>
+            <a:pPr marL="342900" indent="-342900">
+              <a:buAutoNum type="arabicPeriod"/>
+            </a:pPr>
+            <a:r>
+              <a:rPr lang="en-US" sz="1600" dirty="0">
+                <a:latin typeface="-apple-system"/>
+                <a:ea typeface="Roboto" panose="02000000000000000000" pitchFamily="2" charset="0"/>
+              </a:rPr>
+              <a:t>A </a:t>
+            </a:r>
+            <a:r>
+              <a:rPr lang="en-US" sz="1600" b="1" dirty="0">
+                <a:latin typeface="-apple-system"/>
+                <a:ea typeface="Roboto" panose="02000000000000000000" pitchFamily="2" charset="0"/>
+              </a:rPr>
+              <a:t>pointer (reference) to the next node </a:t>
+            </a:r>
+            <a:r>
+              <a:rPr lang="en-US" sz="1600" dirty="0">
+                <a:latin typeface="-apple-system"/>
+                <a:ea typeface="Roboto" panose="02000000000000000000" pitchFamily="2" charset="0"/>
+              </a:rPr>
+              <a:t>(and in a doubly linked list, also a reference to the previous node).</a:t>
+            </a:r>
+          </a:p>
+          <a:p>
+            <a:endParaRPr lang="en-US" sz="1600" b="1" dirty="0">
+              <a:latin typeface="-apple-system"/>
+              <a:ea typeface="Roboto" panose="02000000000000000000" pitchFamily="2" charset="0"/>
+            </a:endParaRPr>
+          </a:p>
+          <a:p>
+            <a:endParaRPr lang="en-US" sz="1600" b="1" dirty="0">
+              <a:latin typeface="-apple-system"/>
+              <a:ea typeface="Roboto" panose="02000000000000000000" pitchFamily="2" charset="0"/>
+            </a:endParaRPr>
+          </a:p>
+          <a:p>
+            <a:endParaRPr lang="en-US" sz="1600" b="1" dirty="0">
+              <a:latin typeface="-apple-system"/>
+              <a:ea typeface="Roboto" panose="02000000000000000000" pitchFamily="2" charset="0"/>
+            </a:endParaRPr>
+          </a:p>
+          <a:p>
+            <a:endParaRPr lang="en-US" sz="1600" b="1" dirty="0">
+              <a:latin typeface="-apple-system"/>
+              <a:ea typeface="Roboto" panose="02000000000000000000" pitchFamily="2" charset="0"/>
+            </a:endParaRPr>
+          </a:p>
+          <a:p>
+            <a:r>
+              <a:rPr lang="en-US" sz="1600" b="1" dirty="0">
+                <a:latin typeface="-apple-system"/>
+                <a:ea typeface="Roboto" panose="02000000000000000000" pitchFamily="2" charset="0"/>
+              </a:rPr>
+              <a:t>Properties and Methods</a:t>
+            </a:r>
+          </a:p>
+          <a:p>
+            <a:pPr marL="285750" indent="-285750">
+              <a:buFont typeface="Arial" panose="020B0604020202020204" pitchFamily="34" charset="0"/>
+              <a:buChar char="•"/>
+            </a:pPr>
+            <a:endParaRPr lang="en-US" sz="1600" b="1" dirty="0">
+              <a:latin typeface="-apple-system"/>
+              <a:ea typeface="Roboto" panose="02000000000000000000" pitchFamily="2" charset="0"/>
+            </a:endParaRPr>
+          </a:p>
+          <a:p>
+            <a:pPr marL="285750" indent="-285750">
+              <a:buFont typeface="Arial" panose="020B0604020202020204" pitchFamily="34" charset="0"/>
+              <a:buChar char="•"/>
+            </a:pPr>
+            <a:endParaRPr lang="en-US" sz="1600" dirty="0">
+              <a:latin typeface="-apple-system"/>
+              <a:ea typeface="Roboto" panose="02000000000000000000" pitchFamily="2" charset="0"/>
+            </a:endParaRPr>
+          </a:p>
+          <a:p>
+            <a:pPr marL="285750" indent="-285750">
+              <a:buFont typeface="Arial" panose="020B0604020202020204" pitchFamily="34" charset="0"/>
+              <a:buChar char="•"/>
+            </a:pPr>
+            <a:endParaRPr lang="en-US" sz="1600" dirty="0">
+              <a:latin typeface="-apple-system"/>
+              <a:ea typeface="Roboto" panose="02000000000000000000" pitchFamily="2" charset="0"/>
+            </a:endParaRPr>
+          </a:p>
+        </p:txBody>
+      </p:sp>
+      <p:graphicFrame>
+        <p:nvGraphicFramePr>
+          <p:cNvPr id="2" name="Table 1">
+            <a:extLst>
+              <a:ext uri="{FF2B5EF4-FFF2-40B4-BE49-F238E27FC236}">
+                <a16:creationId xmlns:a16="http://schemas.microsoft.com/office/drawing/2014/main" id="{8AA9CE1E-6F3B-3645-15B0-C75F4DA91A7D}"/>
+              </a:ext>
+            </a:extLst>
+          </p:cNvPr>
+          <p:cNvGraphicFramePr>
+            <a:graphicFrameLocks noGrp="1"/>
+          </p:cNvGraphicFramePr>
+          <p:nvPr>
+            <p:extLst>
+              <p:ext uri="{D42A27DB-BD31-4B8C-83A1-F6EECF244321}">
+                <p14:modId xmlns:p14="http://schemas.microsoft.com/office/powerpoint/2010/main" val="1182952005"/>
+              </p:ext>
+            </p:extLst>
+          </p:nvPr>
+        </p:nvGraphicFramePr>
+        <p:xfrm>
+          <a:off x="792226" y="3652635"/>
+          <a:ext cx="10604500" cy="2626186"/>
+        </p:xfrm>
+        <a:graphic>
+          <a:graphicData uri="http://schemas.openxmlformats.org/drawingml/2006/table">
+            <a:tbl>
+              <a:tblPr firstRow="1" bandRow="1">
+                <a:tableStyleId>{5C22544A-7EE6-4342-B048-85BDC9FD1C3A}</a:tableStyleId>
+              </a:tblPr>
+              <a:tblGrid>
+                <a:gridCol w="5302250">
+                  <a:extLst>
+                    <a:ext uri="{9D8B030D-6E8A-4147-A177-3AD203B41FA5}">
+                      <a16:colId xmlns:a16="http://schemas.microsoft.com/office/drawing/2014/main" val="3479775401"/>
+                    </a:ext>
+                  </a:extLst>
+                </a:gridCol>
+                <a:gridCol w="5302250">
+                  <a:extLst>
+                    <a:ext uri="{9D8B030D-6E8A-4147-A177-3AD203B41FA5}">
+                      <a16:colId xmlns:a16="http://schemas.microsoft.com/office/drawing/2014/main" val="954773244"/>
+                    </a:ext>
+                  </a:extLst>
+                </a:gridCol>
+              </a:tblGrid>
+              <a:tr h="296714">
+                <a:tc>
+                  <a:txBody>
+                    <a:bodyPr/>
+                    <a:lstStyle/>
+                    <a:p>
+                      <a:r>
+                        <a:rPr lang="en-US" sz="1400" dirty="0">
+                          <a:latin typeface="Roboto" panose="02000000000000000000" pitchFamily="2" charset="0"/>
+                          <a:ea typeface="Roboto" panose="02000000000000000000" pitchFamily="2" charset="0"/>
+                        </a:rPr>
+                        <a:t>Property / Method</a:t>
+                      </a:r>
+                    </a:p>
+                  </a:txBody>
+                  <a:tcPr/>
+                </a:tc>
+                <a:tc>
+                  <a:txBody>
+                    <a:bodyPr/>
+                    <a:lstStyle/>
+                    <a:p>
+                      <a:r>
+                        <a:rPr lang="en-US" sz="1400" dirty="0">
+                          <a:latin typeface="Roboto" panose="02000000000000000000" pitchFamily="2" charset="0"/>
+                          <a:ea typeface="Roboto" panose="02000000000000000000" pitchFamily="2" charset="0"/>
+                        </a:rPr>
+                        <a:t>Description</a:t>
+                      </a:r>
+                    </a:p>
+                  </a:txBody>
+                  <a:tcPr/>
+                </a:tc>
+                <a:extLst>
+                  <a:ext uri="{0D108BD9-81ED-4DB2-BD59-A6C34878D82A}">
+                    <a16:rowId xmlns:a16="http://schemas.microsoft.com/office/drawing/2014/main" val="412094397"/>
+                  </a:ext>
+                </a:extLst>
+              </a:tr>
+              <a:tr h="454243">
+                <a:tc>
+                  <a:txBody>
+                    <a:bodyPr/>
+                    <a:lstStyle/>
+                    <a:p>
+                      <a:r>
+                        <a:rPr lang="en-US" sz="1400" b="1" dirty="0">
+                          <a:latin typeface="Roboto" panose="02000000000000000000" pitchFamily="2" charset="0"/>
+                          <a:ea typeface="Roboto" panose="02000000000000000000" pitchFamily="2" charset="0"/>
+                        </a:rPr>
+                        <a:t>Count</a:t>
+                      </a:r>
+                    </a:p>
+                  </a:txBody>
+                  <a:tcPr/>
+                </a:tc>
+                <a:tc>
+                  <a:txBody>
+                    <a:bodyPr/>
+                    <a:lstStyle/>
+                    <a:p>
+                      <a:r>
+                        <a:rPr lang="en-US" sz="1400" dirty="0">
+                          <a:latin typeface="Roboto" panose="02000000000000000000" pitchFamily="2" charset="0"/>
+                          <a:ea typeface="Roboto" panose="02000000000000000000" pitchFamily="2" charset="0"/>
+                        </a:rPr>
+                        <a:t>Gets the number of nodes in the LinkedList.</a:t>
+                      </a:r>
+                    </a:p>
+                  </a:txBody>
+                  <a:tcPr/>
+                </a:tc>
+                <a:extLst>
+                  <a:ext uri="{0D108BD9-81ED-4DB2-BD59-A6C34878D82A}">
+                    <a16:rowId xmlns:a16="http://schemas.microsoft.com/office/drawing/2014/main" val="3203117005"/>
+                  </a:ext>
+                </a:extLst>
+              </a:tr>
+              <a:tr h="454243">
+                <a:tc>
+                  <a:txBody>
+                    <a:bodyPr/>
+                    <a:lstStyle/>
+                    <a:p>
+                      <a:r>
+                        <a:rPr lang="en-US" sz="1400" b="1" dirty="0">
+                          <a:latin typeface="Roboto" panose="02000000000000000000" pitchFamily="2" charset="0"/>
+                          <a:ea typeface="Roboto" panose="02000000000000000000" pitchFamily="2" charset="0"/>
+                        </a:rPr>
+                        <a:t>First</a:t>
+                      </a:r>
+                    </a:p>
+                  </a:txBody>
+                  <a:tcPr/>
+                </a:tc>
+                <a:tc>
+                  <a:txBody>
+                    <a:bodyPr/>
+                    <a:lstStyle/>
+                    <a:p>
+                      <a:r>
+                        <a:rPr lang="en-US" sz="1400" dirty="0">
+                          <a:latin typeface="Roboto" panose="02000000000000000000" pitchFamily="2" charset="0"/>
+                          <a:ea typeface="Roboto" panose="02000000000000000000" pitchFamily="2" charset="0"/>
+                        </a:rPr>
+                        <a:t>Gets the first node of the LinkedList.</a:t>
+                      </a:r>
+                    </a:p>
+                  </a:txBody>
+                  <a:tcPr/>
+                </a:tc>
+                <a:extLst>
+                  <a:ext uri="{0D108BD9-81ED-4DB2-BD59-A6C34878D82A}">
+                    <a16:rowId xmlns:a16="http://schemas.microsoft.com/office/drawing/2014/main" val="1108414833"/>
+                  </a:ext>
+                </a:extLst>
+              </a:tr>
+              <a:tr h="454243">
+                <a:tc>
+                  <a:txBody>
+                    <a:bodyPr/>
+                    <a:lstStyle/>
+                    <a:p>
+                      <a:r>
+                        <a:rPr lang="en-US" sz="1400" b="1" dirty="0">
+                          <a:latin typeface="Roboto" panose="02000000000000000000" pitchFamily="2" charset="0"/>
+                          <a:ea typeface="Roboto" panose="02000000000000000000" pitchFamily="2" charset="0"/>
+                        </a:rPr>
+                        <a:t>Last</a:t>
+                      </a:r>
+                    </a:p>
+                  </a:txBody>
+                  <a:tcPr/>
+                </a:tc>
+                <a:tc>
+                  <a:txBody>
+                    <a:bodyPr/>
+                    <a:lstStyle/>
+                    <a:p>
+                      <a:r>
+                        <a:rPr lang="en-US" sz="1400" dirty="0">
+                          <a:latin typeface="Roboto" panose="02000000000000000000" pitchFamily="2" charset="0"/>
+                          <a:ea typeface="Roboto" panose="02000000000000000000" pitchFamily="2" charset="0"/>
+                        </a:rPr>
+                        <a:t>Gets the last node of the LinkedList.</a:t>
+                      </a:r>
+                    </a:p>
+                  </a:txBody>
+                  <a:tcPr/>
+                </a:tc>
+                <a:extLst>
+                  <a:ext uri="{0D108BD9-81ED-4DB2-BD59-A6C34878D82A}">
+                    <a16:rowId xmlns:a16="http://schemas.microsoft.com/office/drawing/2014/main" val="3710949462"/>
+                  </a:ext>
+                </a:extLst>
+              </a:tr>
+              <a:tr h="504414">
+                <a:tc>
+                  <a:txBody>
+                    <a:bodyPr/>
+                    <a:lstStyle/>
+                    <a:p>
+                      <a:r>
+                        <a:rPr lang="en-US" sz="1400" b="1" dirty="0" err="1">
+                          <a:latin typeface="Roboto" panose="02000000000000000000" pitchFamily="2" charset="0"/>
+                          <a:ea typeface="Roboto" panose="02000000000000000000" pitchFamily="2" charset="0"/>
+                        </a:rPr>
+                        <a:t>AddAfter</a:t>
+                      </a:r>
+                      <a:r>
+                        <a:rPr lang="en-US" sz="1400" b="1" dirty="0">
+                          <a:latin typeface="Roboto" panose="02000000000000000000" pitchFamily="2" charset="0"/>
+                          <a:ea typeface="Roboto" panose="02000000000000000000" pitchFamily="2" charset="0"/>
+                        </a:rPr>
+                        <a:t>(</a:t>
+                      </a:r>
+                      <a:r>
+                        <a:rPr lang="en-US" sz="1400" b="0" dirty="0" err="1">
+                          <a:solidFill>
+                            <a:schemeClr val="accent5"/>
+                          </a:solidFill>
+                          <a:latin typeface="Roboto" panose="02000000000000000000" pitchFamily="2" charset="0"/>
+                          <a:ea typeface="Roboto" panose="02000000000000000000" pitchFamily="2" charset="0"/>
+                        </a:rPr>
+                        <a:t>LinkedListNode</a:t>
+                      </a:r>
+                      <a:r>
+                        <a:rPr lang="en-US" sz="1400" b="0" dirty="0">
+                          <a:solidFill>
+                            <a:schemeClr val="accent5"/>
+                          </a:solidFill>
+                          <a:latin typeface="Roboto" panose="02000000000000000000" pitchFamily="2" charset="0"/>
+                          <a:ea typeface="Roboto" panose="02000000000000000000" pitchFamily="2" charset="0"/>
+                        </a:rPr>
+                        <a:t>&lt;T&gt; node</a:t>
+                      </a:r>
+                      <a:r>
+                        <a:rPr lang="en-US" sz="1400" b="0" dirty="0">
+                          <a:latin typeface="Roboto" panose="02000000000000000000" pitchFamily="2" charset="0"/>
+                          <a:ea typeface="Roboto" panose="02000000000000000000" pitchFamily="2" charset="0"/>
+                        </a:rPr>
+                        <a:t>, T value</a:t>
+                      </a:r>
+                      <a:r>
+                        <a:rPr lang="en-US" sz="1400" b="1" dirty="0">
+                          <a:latin typeface="Roboto" panose="02000000000000000000" pitchFamily="2" charset="0"/>
+                          <a:ea typeface="Roboto" panose="02000000000000000000" pitchFamily="2" charset="0"/>
+                        </a:rPr>
+                        <a:t>)</a:t>
+                      </a:r>
+                    </a:p>
+                  </a:txBody>
+                  <a:tcPr/>
+                </a:tc>
+                <a:tc>
+                  <a:txBody>
+                    <a:bodyPr/>
+                    <a:lstStyle/>
+                    <a:p>
+                      <a:r>
+                        <a:rPr lang="en-US" sz="1400" dirty="0">
+                          <a:latin typeface="Roboto" panose="02000000000000000000" pitchFamily="2" charset="0"/>
+                          <a:ea typeface="Roboto" panose="02000000000000000000" pitchFamily="2" charset="0"/>
+                        </a:rPr>
+                        <a:t>Adds a new node with the specified value after the given node.</a:t>
+                      </a:r>
+                    </a:p>
+                  </a:txBody>
+                  <a:tcPr/>
+                </a:tc>
+                <a:extLst>
+                  <a:ext uri="{0D108BD9-81ED-4DB2-BD59-A6C34878D82A}">
+                    <a16:rowId xmlns:a16="http://schemas.microsoft.com/office/drawing/2014/main" val="677495998"/>
+                  </a:ext>
+                </a:extLst>
+              </a:tr>
+              <a:tr h="454243">
+                <a:tc>
+                  <a:txBody>
+                    <a:bodyPr/>
+                    <a:lstStyle/>
+                    <a:p>
+                      <a:r>
+                        <a:rPr lang="en-US" sz="1400" b="1" dirty="0" err="1">
+                          <a:latin typeface="Roboto" panose="02000000000000000000" pitchFamily="2" charset="0"/>
+                          <a:ea typeface="Roboto" panose="02000000000000000000" pitchFamily="2" charset="0"/>
+                        </a:rPr>
+                        <a:t>AddBefore</a:t>
+                      </a:r>
+                      <a:r>
+                        <a:rPr lang="en-US" sz="1400" b="1" dirty="0">
+                          <a:latin typeface="Roboto" panose="02000000000000000000" pitchFamily="2" charset="0"/>
+                          <a:ea typeface="Roboto" panose="02000000000000000000" pitchFamily="2" charset="0"/>
+                        </a:rPr>
+                        <a:t>(</a:t>
+                      </a:r>
+                      <a:r>
+                        <a:rPr lang="en-US" sz="1400" b="0" dirty="0" err="1">
+                          <a:solidFill>
+                            <a:schemeClr val="accent5"/>
+                          </a:solidFill>
+                          <a:latin typeface="Roboto" panose="02000000000000000000" pitchFamily="2" charset="0"/>
+                          <a:ea typeface="Roboto" panose="02000000000000000000" pitchFamily="2" charset="0"/>
+                        </a:rPr>
+                        <a:t>LinkedListNode</a:t>
+                      </a:r>
+                      <a:r>
+                        <a:rPr lang="en-US" sz="1400" b="0" dirty="0">
+                          <a:solidFill>
+                            <a:schemeClr val="accent5"/>
+                          </a:solidFill>
+                          <a:latin typeface="Roboto" panose="02000000000000000000" pitchFamily="2" charset="0"/>
+                          <a:ea typeface="Roboto" panose="02000000000000000000" pitchFamily="2" charset="0"/>
+                        </a:rPr>
+                        <a:t>&lt;T&gt; node</a:t>
+                      </a:r>
+                      <a:r>
+                        <a:rPr lang="en-US" sz="1400" b="0" dirty="0">
+                          <a:latin typeface="Roboto" panose="02000000000000000000" pitchFamily="2" charset="0"/>
+                          <a:ea typeface="Roboto" panose="02000000000000000000" pitchFamily="2" charset="0"/>
+                        </a:rPr>
+                        <a:t>, T value</a:t>
+                      </a:r>
+                      <a:r>
+                        <a:rPr lang="en-US" sz="1400" b="1" dirty="0">
+                          <a:latin typeface="Roboto" panose="02000000000000000000" pitchFamily="2" charset="0"/>
+                          <a:ea typeface="Roboto" panose="02000000000000000000" pitchFamily="2" charset="0"/>
+                        </a:rPr>
+                        <a:t>)</a:t>
+                      </a:r>
+                    </a:p>
+                  </a:txBody>
+                  <a:tcPr/>
+                </a:tc>
+                <a:tc>
+                  <a:txBody>
+                    <a:bodyPr/>
+                    <a:lstStyle/>
+                    <a:p>
+                      <a:r>
+                        <a:rPr lang="en-US" sz="1400" dirty="0">
+                          <a:latin typeface="Roboto" panose="02000000000000000000" pitchFamily="2" charset="0"/>
+                          <a:ea typeface="Roboto" panose="02000000000000000000" pitchFamily="2" charset="0"/>
+                        </a:rPr>
+                        <a:t>Adds a new node with the specified value before the given node.</a:t>
+                      </a:r>
+                    </a:p>
+                  </a:txBody>
+                  <a:tcPr/>
+                </a:tc>
+                <a:extLst>
+                  <a:ext uri="{0D108BD9-81ED-4DB2-BD59-A6C34878D82A}">
+                    <a16:rowId xmlns:a16="http://schemas.microsoft.com/office/drawing/2014/main" val="2671933848"/>
+                  </a:ext>
+                </a:extLst>
+              </a:tr>
+            </a:tbl>
+          </a:graphicData>
+        </a:graphic>
+      </p:graphicFrame>
+      <p:pic>
+        <p:nvPicPr>
+          <p:cNvPr id="5" name="Picture 4">
+            <a:extLst>
+              <a:ext uri="{FF2B5EF4-FFF2-40B4-BE49-F238E27FC236}">
+                <a16:creationId xmlns:a16="http://schemas.microsoft.com/office/drawing/2014/main" id="{99548FB3-0654-B12F-4EE8-8A27796E23D1}"/>
+              </a:ext>
+            </a:extLst>
+          </p:cNvPr>
+          <p:cNvPicPr>
+            <a:picLocks noChangeAspect="1"/>
+          </p:cNvPicPr>
+          <p:nvPr/>
+        </p:nvPicPr>
+        <p:blipFill>
+          <a:blip r:embed="rId2"/>
+          <a:stretch>
+            <a:fillRect/>
+          </a:stretch>
+        </p:blipFill>
+        <p:spPr>
+          <a:xfrm>
+            <a:off x="5621952" y="2411607"/>
+            <a:ext cx="4310745" cy="1116639"/>
+          </a:xfrm>
+          <a:prstGeom prst="rect">
+            <a:avLst/>
+          </a:prstGeom>
+        </p:spPr>
+      </p:pic>
+    </p:spTree>
+    <p:extLst>
+      <p:ext uri="{BB962C8B-B14F-4D97-AF65-F5344CB8AC3E}">
+        <p14:creationId xmlns:p14="http://schemas.microsoft.com/office/powerpoint/2010/main" val="597751933"/>
+      </p:ext>
+    </p:extLst>
+  </p:cSld>
+  <p:clrMapOvr>
+    <a:masterClrMapping/>
+  </p:clrMapOvr>
+</p:sld>
+</file>
+
+<file path=ppt/slides/slide12.xml><?xml version="1.0" encoding="utf-8"?>
+<p:sld xmlns:a="http://schemas.openxmlformats.org/drawingml/2006/main" xmlns:r="http://schemas.openxmlformats.org/officeDocument/2006/relationships" xmlns:p="http://schemas.openxmlformats.org/presentationml/2006/main">
+  <p:cSld>
+    <p:bg>
+      <p:bgPr>
+        <a:solidFill>
+          <a:schemeClr val="bg1"/>
+        </a:solidFill>
+        <a:effectLst/>
+      </p:bgPr>
+    </p:bg>
+    <p:spTree>
+      <p:nvGrpSpPr>
+        <p:cNvPr id="1" name="">
+          <a:extLst>
+            <a:ext uri="{FF2B5EF4-FFF2-40B4-BE49-F238E27FC236}">
+              <a16:creationId xmlns:a16="http://schemas.microsoft.com/office/drawing/2014/main" id="{DE242DA8-223F-69D1-3155-08C7910051D0}"/>
+            </a:ext>
+          </a:extLst>
+        </p:cNvPr>
+        <p:cNvGrpSpPr/>
+        <p:nvPr/>
+      </p:nvGrpSpPr>
+      <p:grpSpPr>
+        <a:xfrm>
+          <a:off x="0" y="0"/>
+          <a:ext cx="0" cy="0"/>
+          <a:chOff x="0" y="0"/>
+          <a:chExt cx="0" cy="0"/>
+        </a:xfrm>
+      </p:grpSpPr>
+      <p:sp useBgFill="1">
+        <p:nvSpPr>
+          <p:cNvPr id="10" name="Rectangle 9">
+            <a:extLst>
+              <a:ext uri="{FF2B5EF4-FFF2-40B4-BE49-F238E27FC236}">
+                <a16:creationId xmlns:a16="http://schemas.microsoft.com/office/drawing/2014/main" id="{A59D62A0-8E6F-78D3-AA73-6D5E07342E2E}"/>
+              </a:ext>
+              <a:ext uri="{C183D7F6-B498-43B3-948B-1728B52AA6E4}">
+                <adec:decorative xmlns:adec="http://schemas.microsoft.com/office/drawing/2017/decorative" val="1"/>
+              </a:ext>
+            </a:extLst>
+          </p:cNvPr>
+          <p:cNvSpPr>
+            <a:spLocks noGrp="1" noRot="1" noChangeAspect="1" noMove="1" noResize="1" noEditPoints="1" noAdjustHandles="1" noChangeArrowheads="1" noChangeShapeType="1" noTextEdit="1"/>
+          </p:cNvSpPr>
+          <p:nvPr>
+            <p:extLst>
+              <p:ext uri="{386F3935-93C4-4BCD-93E2-E3B085C9AB24}">
+                <p16:designElem xmlns:p16="http://schemas.microsoft.com/office/powerpoint/2015/main" val="1"/>
+              </p:ext>
+            </p:extLst>
+          </p:nvPr>
+        </p:nvSpPr>
+        <p:spPr>
+          <a:xfrm>
+            <a:off x="0" y="0"/>
+            <a:ext cx="12188952" cy="6858000"/>
+          </a:xfrm>
+          <a:prstGeom prst="rect">
+            <a:avLst/>
+          </a:prstGeom>
+          <a:ln>
+            <a:noFill/>
+          </a:ln>
+        </p:spPr>
+        <p:style>
+          <a:lnRef idx="2">
+            <a:schemeClr val="accent1">
+              <a:shade val="50000"/>
+            </a:schemeClr>
+          </a:lnRef>
+          <a:fillRef idx="1">
+            <a:schemeClr val="accent1"/>
+          </a:fillRef>
+          <a:effectRef idx="0">
+            <a:schemeClr val="accent1"/>
+          </a:effectRef>
+          <a:fontRef idx="minor">
+            <a:schemeClr val="lt1"/>
+          </a:fontRef>
+        </p:style>
+        <p:txBody>
+          <a:bodyPr rtlCol="0" anchor="ctr"/>
+          <a:lstStyle/>
+          <a:p>
+            <a:pPr algn="ctr"/>
+            <a:endParaRPr lang="en-US"/>
+          </a:p>
+        </p:txBody>
+      </p:sp>
+      <p:graphicFrame>
+        <p:nvGraphicFramePr>
+          <p:cNvPr id="2" name="Table 1">
+            <a:extLst>
+              <a:ext uri="{FF2B5EF4-FFF2-40B4-BE49-F238E27FC236}">
+                <a16:creationId xmlns:a16="http://schemas.microsoft.com/office/drawing/2014/main" id="{DFCD6A20-5D0F-6F10-45D8-C68432C5E832}"/>
+              </a:ext>
+            </a:extLst>
+          </p:cNvPr>
+          <p:cNvGraphicFramePr>
+            <a:graphicFrameLocks noGrp="1"/>
+          </p:cNvGraphicFramePr>
+          <p:nvPr>
+            <p:extLst>
+              <p:ext uri="{D42A27DB-BD31-4B8C-83A1-F6EECF244321}">
+                <p14:modId xmlns:p14="http://schemas.microsoft.com/office/powerpoint/2010/main" val="1864402862"/>
+              </p:ext>
+            </p:extLst>
+          </p:nvPr>
+        </p:nvGraphicFramePr>
+        <p:xfrm>
+          <a:off x="908050" y="675768"/>
+          <a:ext cx="10604500" cy="5334804"/>
+        </p:xfrm>
+        <a:graphic>
+          <a:graphicData uri="http://schemas.openxmlformats.org/drawingml/2006/table">
+            <a:tbl>
+              <a:tblPr firstRow="1" bandRow="1">
+                <a:tableStyleId>{5C22544A-7EE6-4342-B048-85BDC9FD1C3A}</a:tableStyleId>
+              </a:tblPr>
+              <a:tblGrid>
+                <a:gridCol w="5302250">
+                  <a:extLst>
+                    <a:ext uri="{9D8B030D-6E8A-4147-A177-3AD203B41FA5}">
+                      <a16:colId xmlns:a16="http://schemas.microsoft.com/office/drawing/2014/main" val="3479775401"/>
+                    </a:ext>
+                  </a:extLst>
+                </a:gridCol>
+                <a:gridCol w="5302250">
+                  <a:extLst>
+                    <a:ext uri="{9D8B030D-6E8A-4147-A177-3AD203B41FA5}">
+                      <a16:colId xmlns:a16="http://schemas.microsoft.com/office/drawing/2014/main" val="954773244"/>
+                    </a:ext>
+                  </a:extLst>
+                </a:gridCol>
+              </a:tblGrid>
+              <a:tr h="282506">
+                <a:tc>
+                  <a:txBody>
+                    <a:bodyPr/>
+                    <a:lstStyle/>
+                    <a:p>
+                      <a:r>
+                        <a:rPr lang="en-US" sz="1400" dirty="0">
+                          <a:latin typeface="Roboto" panose="02000000000000000000" pitchFamily="2" charset="0"/>
+                          <a:ea typeface="Roboto" panose="02000000000000000000" pitchFamily="2" charset="0"/>
+                        </a:rPr>
+                        <a:t>Property / Method</a:t>
+                      </a:r>
+                    </a:p>
+                  </a:txBody>
+                  <a:tcPr/>
+                </a:tc>
+                <a:tc>
+                  <a:txBody>
+                    <a:bodyPr/>
+                    <a:lstStyle/>
+                    <a:p>
+                      <a:r>
+                        <a:rPr lang="en-US" sz="1400" dirty="0">
+                          <a:latin typeface="Roboto" panose="02000000000000000000" pitchFamily="2" charset="0"/>
+                          <a:ea typeface="Roboto" panose="02000000000000000000" pitchFamily="2" charset="0"/>
+                        </a:rPr>
+                        <a:t>Description</a:t>
+                      </a:r>
+                    </a:p>
+                  </a:txBody>
+                  <a:tcPr/>
+                </a:tc>
+                <a:extLst>
+                  <a:ext uri="{0D108BD9-81ED-4DB2-BD59-A6C34878D82A}">
+                    <a16:rowId xmlns:a16="http://schemas.microsoft.com/office/drawing/2014/main" val="412094397"/>
+                  </a:ext>
+                </a:extLst>
+              </a:tr>
+              <a:tr h="416306">
+                <a:tc>
+                  <a:txBody>
+                    <a:bodyPr/>
+                    <a:lstStyle/>
+                    <a:p>
+                      <a:r>
+                        <a:rPr lang="en-US" sz="1400" b="1" dirty="0" err="1">
+                          <a:latin typeface="Roboto" panose="02000000000000000000" pitchFamily="2" charset="0"/>
+                          <a:ea typeface="Roboto" panose="02000000000000000000" pitchFamily="2" charset="0"/>
+                        </a:rPr>
+                        <a:t>AddFirst</a:t>
+                      </a:r>
+                      <a:r>
+                        <a:rPr lang="en-US" sz="1400" b="1" dirty="0">
+                          <a:latin typeface="Roboto" panose="02000000000000000000" pitchFamily="2" charset="0"/>
+                          <a:ea typeface="Roboto" panose="02000000000000000000" pitchFamily="2" charset="0"/>
+                        </a:rPr>
+                        <a:t>(</a:t>
+                      </a:r>
+                      <a:r>
+                        <a:rPr lang="en-US" sz="1400" b="0" dirty="0">
+                          <a:latin typeface="Roboto" panose="02000000000000000000" pitchFamily="2" charset="0"/>
+                          <a:ea typeface="Roboto" panose="02000000000000000000" pitchFamily="2" charset="0"/>
+                        </a:rPr>
+                        <a:t>T value</a:t>
+                      </a:r>
+                      <a:r>
+                        <a:rPr lang="en-US" sz="1400" b="1" dirty="0">
+                          <a:latin typeface="Roboto" panose="02000000000000000000" pitchFamily="2" charset="0"/>
+                          <a:ea typeface="Roboto" panose="02000000000000000000" pitchFamily="2" charset="0"/>
+                        </a:rPr>
+                        <a:t>)</a:t>
+                      </a:r>
+                    </a:p>
+                  </a:txBody>
+                  <a:tcPr/>
+                </a:tc>
+                <a:tc>
+                  <a:txBody>
+                    <a:bodyPr/>
+                    <a:lstStyle/>
+                    <a:p>
+                      <a:r>
+                        <a:rPr lang="en-US" sz="1400" dirty="0">
+                          <a:latin typeface="Roboto" panose="02000000000000000000" pitchFamily="2" charset="0"/>
+                          <a:ea typeface="Roboto" panose="02000000000000000000" pitchFamily="2" charset="0"/>
+                        </a:rPr>
+                        <a:t>Adds a new node with the specified value at the beginning of the list.</a:t>
+                      </a:r>
+                    </a:p>
+                  </a:txBody>
+                  <a:tcPr/>
+                </a:tc>
+                <a:extLst>
+                  <a:ext uri="{0D108BD9-81ED-4DB2-BD59-A6C34878D82A}">
+                    <a16:rowId xmlns:a16="http://schemas.microsoft.com/office/drawing/2014/main" val="890513449"/>
+                  </a:ext>
+                </a:extLst>
+              </a:tr>
+              <a:tr h="480261">
+                <a:tc>
+                  <a:txBody>
+                    <a:bodyPr/>
+                    <a:lstStyle/>
+                    <a:p>
+                      <a:r>
+                        <a:rPr lang="en-US" sz="1400" b="1" dirty="0" err="1">
+                          <a:latin typeface="Roboto" panose="02000000000000000000" pitchFamily="2" charset="0"/>
+                          <a:ea typeface="Roboto" panose="02000000000000000000" pitchFamily="2" charset="0"/>
+                        </a:rPr>
+                        <a:t>AddLast</a:t>
+                      </a:r>
+                      <a:r>
+                        <a:rPr lang="en-US" sz="1400" b="1" dirty="0">
+                          <a:latin typeface="Roboto" panose="02000000000000000000" pitchFamily="2" charset="0"/>
+                          <a:ea typeface="Roboto" panose="02000000000000000000" pitchFamily="2" charset="0"/>
+                        </a:rPr>
+                        <a:t>(</a:t>
+                      </a:r>
+                      <a:r>
+                        <a:rPr lang="en-US" sz="1400" b="0" dirty="0">
+                          <a:latin typeface="Roboto" panose="02000000000000000000" pitchFamily="2" charset="0"/>
+                          <a:ea typeface="Roboto" panose="02000000000000000000" pitchFamily="2" charset="0"/>
+                        </a:rPr>
+                        <a:t>T value</a:t>
+                      </a:r>
+                      <a:r>
+                        <a:rPr lang="en-US" sz="1400" b="1" dirty="0">
+                          <a:latin typeface="Roboto" panose="02000000000000000000" pitchFamily="2" charset="0"/>
+                          <a:ea typeface="Roboto" panose="02000000000000000000" pitchFamily="2" charset="0"/>
+                        </a:rPr>
+                        <a:t>)</a:t>
+                      </a:r>
+                    </a:p>
+                  </a:txBody>
+                  <a:tcPr/>
+                </a:tc>
+                <a:tc>
+                  <a:txBody>
+                    <a:bodyPr/>
+                    <a:lstStyle/>
+                    <a:p>
+                      <a:r>
+                        <a:rPr lang="en-US" sz="1400" dirty="0">
+                          <a:latin typeface="Roboto" panose="02000000000000000000" pitchFamily="2" charset="0"/>
+                          <a:ea typeface="Roboto" panose="02000000000000000000" pitchFamily="2" charset="0"/>
+                        </a:rPr>
+                        <a:t>Adds a new node with the specified value at the end of the list.</a:t>
+                      </a:r>
+                    </a:p>
+                  </a:txBody>
+                  <a:tcPr/>
+                </a:tc>
+                <a:extLst>
+                  <a:ext uri="{0D108BD9-81ED-4DB2-BD59-A6C34878D82A}">
+                    <a16:rowId xmlns:a16="http://schemas.microsoft.com/office/drawing/2014/main" val="3203117005"/>
+                  </a:ext>
+                </a:extLst>
+              </a:tr>
+              <a:tr h="480261">
+                <a:tc>
+                  <a:txBody>
+                    <a:bodyPr/>
+                    <a:lstStyle/>
+                    <a:p>
+                      <a:r>
+                        <a:rPr lang="en-US" sz="1400" b="1" dirty="0">
+                          <a:latin typeface="Roboto" panose="02000000000000000000" pitchFamily="2" charset="0"/>
+                          <a:ea typeface="Roboto" panose="02000000000000000000" pitchFamily="2" charset="0"/>
+                        </a:rPr>
+                        <a:t>Clear()</a:t>
+                      </a:r>
+                    </a:p>
+                  </a:txBody>
+                  <a:tcPr/>
+                </a:tc>
+                <a:tc>
+                  <a:txBody>
+                    <a:bodyPr/>
+                    <a:lstStyle/>
+                    <a:p>
+                      <a:r>
+                        <a:rPr lang="en-US" sz="1400" dirty="0">
+                          <a:latin typeface="Roboto" panose="02000000000000000000" pitchFamily="2" charset="0"/>
+                          <a:ea typeface="Roboto" panose="02000000000000000000" pitchFamily="2" charset="0"/>
+                        </a:rPr>
+                        <a:t>Removes all nodes from the LinkedList.</a:t>
+                      </a:r>
+                    </a:p>
+                  </a:txBody>
+                  <a:tcPr/>
+                </a:tc>
+                <a:extLst>
+                  <a:ext uri="{0D108BD9-81ED-4DB2-BD59-A6C34878D82A}">
+                    <a16:rowId xmlns:a16="http://schemas.microsoft.com/office/drawing/2014/main" val="1108414833"/>
+                  </a:ext>
+                </a:extLst>
+              </a:tr>
+              <a:tr h="480261">
+                <a:tc>
+                  <a:txBody>
+                    <a:bodyPr/>
+                    <a:lstStyle/>
+                    <a:p>
+                      <a:r>
+                        <a:rPr lang="en-US" sz="1400" b="1" dirty="0">
+                          <a:latin typeface="Roboto" panose="02000000000000000000" pitchFamily="2" charset="0"/>
+                          <a:ea typeface="Roboto" panose="02000000000000000000" pitchFamily="2" charset="0"/>
+                        </a:rPr>
+                        <a:t>Contains(</a:t>
+                      </a:r>
+                      <a:r>
+                        <a:rPr lang="en-US" sz="1400" b="0" dirty="0">
+                          <a:latin typeface="Roboto" panose="02000000000000000000" pitchFamily="2" charset="0"/>
+                          <a:ea typeface="Roboto" panose="02000000000000000000" pitchFamily="2" charset="0"/>
+                        </a:rPr>
+                        <a:t>T value</a:t>
+                      </a:r>
+                      <a:r>
+                        <a:rPr lang="en-US" sz="1400" b="1" dirty="0">
+                          <a:latin typeface="Roboto" panose="02000000000000000000" pitchFamily="2" charset="0"/>
+                          <a:ea typeface="Roboto" panose="02000000000000000000" pitchFamily="2" charset="0"/>
+                        </a:rPr>
+                        <a:t>)</a:t>
+                      </a:r>
+                    </a:p>
+                  </a:txBody>
+                  <a:tcPr/>
+                </a:tc>
+                <a:tc>
+                  <a:txBody>
+                    <a:bodyPr/>
+                    <a:lstStyle/>
+                    <a:p>
+                      <a:r>
+                        <a:rPr lang="en-US" sz="1400" dirty="0">
+                          <a:latin typeface="Roboto" panose="02000000000000000000" pitchFamily="2" charset="0"/>
+                          <a:ea typeface="Roboto" panose="02000000000000000000" pitchFamily="2" charset="0"/>
+                        </a:rPr>
+                        <a:t>Checks whether the specified value exists in the LinkedList. Returns true if found, otherwise false.</a:t>
+                      </a:r>
+                    </a:p>
+                  </a:txBody>
+                  <a:tcPr/>
+                </a:tc>
+                <a:extLst>
+                  <a:ext uri="{0D108BD9-81ED-4DB2-BD59-A6C34878D82A}">
+                    <a16:rowId xmlns:a16="http://schemas.microsoft.com/office/drawing/2014/main" val="3710949462"/>
+                  </a:ext>
+                </a:extLst>
+              </a:tr>
+              <a:tr h="480261">
+                <a:tc>
+                  <a:txBody>
+                    <a:bodyPr/>
+                    <a:lstStyle/>
+                    <a:p>
+                      <a:r>
+                        <a:rPr lang="en-US" sz="1400" b="1" dirty="0" err="1">
+                          <a:latin typeface="Roboto" panose="02000000000000000000" pitchFamily="2" charset="0"/>
+                          <a:ea typeface="Roboto" panose="02000000000000000000" pitchFamily="2" charset="0"/>
+                        </a:rPr>
+                        <a:t>CopyTo</a:t>
+                      </a:r>
+                      <a:r>
+                        <a:rPr lang="en-US" sz="1400" b="1" dirty="0">
+                          <a:latin typeface="Roboto" panose="02000000000000000000" pitchFamily="2" charset="0"/>
+                          <a:ea typeface="Roboto" panose="02000000000000000000" pitchFamily="2" charset="0"/>
+                        </a:rPr>
+                        <a:t>(</a:t>
+                      </a:r>
+                      <a:r>
+                        <a:rPr lang="en-US" sz="1400" b="0" dirty="0">
+                          <a:latin typeface="Roboto" panose="02000000000000000000" pitchFamily="2" charset="0"/>
+                          <a:ea typeface="Roboto" panose="02000000000000000000" pitchFamily="2" charset="0"/>
+                        </a:rPr>
+                        <a:t>T[ ] array, int index</a:t>
+                      </a:r>
+                      <a:r>
+                        <a:rPr lang="en-US" sz="1400" b="1" dirty="0">
+                          <a:latin typeface="Roboto" panose="02000000000000000000" pitchFamily="2" charset="0"/>
+                          <a:ea typeface="Roboto" panose="02000000000000000000" pitchFamily="2" charset="0"/>
+                        </a:rPr>
+                        <a:t>)</a:t>
+                      </a:r>
+                    </a:p>
+                  </a:txBody>
+                  <a:tcPr/>
+                </a:tc>
+                <a:tc>
+                  <a:txBody>
+                    <a:bodyPr/>
+                    <a:lstStyle/>
+                    <a:p>
+                      <a:r>
+                        <a:rPr lang="en-US" sz="1400" dirty="0">
+                          <a:latin typeface="Roboto" panose="02000000000000000000" pitchFamily="2" charset="0"/>
+                          <a:ea typeface="Roboto" panose="02000000000000000000" pitchFamily="2" charset="0"/>
+                        </a:rPr>
+                        <a:t>Copies the entire LinkedList&lt;T&gt; to an array starting at the specified index.</a:t>
+                      </a:r>
+                    </a:p>
+                  </a:txBody>
+                  <a:tcPr/>
+                </a:tc>
+                <a:extLst>
+                  <a:ext uri="{0D108BD9-81ED-4DB2-BD59-A6C34878D82A}">
+                    <a16:rowId xmlns:a16="http://schemas.microsoft.com/office/drawing/2014/main" val="677495998"/>
+                  </a:ext>
+                </a:extLst>
+              </a:tr>
+              <a:tr h="480261">
+                <a:tc>
+                  <a:txBody>
+                    <a:bodyPr/>
+                    <a:lstStyle/>
+                    <a:p>
+                      <a:r>
+                        <a:rPr lang="en-US" sz="1400" b="1" dirty="0">
+                          <a:latin typeface="Roboto" panose="02000000000000000000" pitchFamily="2" charset="0"/>
+                          <a:ea typeface="Roboto" panose="02000000000000000000" pitchFamily="2" charset="0"/>
+                        </a:rPr>
+                        <a:t>Find(</a:t>
+                      </a:r>
+                      <a:r>
+                        <a:rPr lang="en-US" sz="1400" b="0" dirty="0">
+                          <a:latin typeface="Roboto" panose="02000000000000000000" pitchFamily="2" charset="0"/>
+                          <a:ea typeface="Roboto" panose="02000000000000000000" pitchFamily="2" charset="0"/>
+                        </a:rPr>
+                        <a:t>T value</a:t>
+                      </a:r>
+                      <a:r>
+                        <a:rPr lang="en-US" sz="1400" b="1" dirty="0">
+                          <a:latin typeface="Roboto" panose="02000000000000000000" pitchFamily="2" charset="0"/>
+                          <a:ea typeface="Roboto" panose="02000000000000000000" pitchFamily="2" charset="0"/>
+                        </a:rPr>
+                        <a:t>)</a:t>
+                      </a:r>
+                    </a:p>
+                  </a:txBody>
+                  <a:tcPr/>
+                </a:tc>
+                <a:tc>
+                  <a:txBody>
+                    <a:bodyPr/>
+                    <a:lstStyle/>
+                    <a:p>
+                      <a:r>
+                        <a:rPr lang="en-US" sz="1400" dirty="0">
+                          <a:latin typeface="Roboto" panose="02000000000000000000" pitchFamily="2" charset="0"/>
+                          <a:ea typeface="Roboto" panose="02000000000000000000" pitchFamily="2" charset="0"/>
+                        </a:rPr>
+                        <a:t>Finds the first node containing the specified value. Returns null if not found.</a:t>
+                      </a:r>
+                    </a:p>
+                  </a:txBody>
+                  <a:tcPr/>
+                </a:tc>
+                <a:extLst>
+                  <a:ext uri="{0D108BD9-81ED-4DB2-BD59-A6C34878D82A}">
+                    <a16:rowId xmlns:a16="http://schemas.microsoft.com/office/drawing/2014/main" val="2671933848"/>
+                  </a:ext>
+                </a:extLst>
+              </a:tr>
+              <a:tr h="480261">
+                <a:tc>
+                  <a:txBody>
+                    <a:bodyPr/>
+                    <a:lstStyle/>
+                    <a:p>
+                      <a:r>
+                        <a:rPr lang="en-US" sz="1400" b="1" dirty="0" err="1">
+                          <a:latin typeface="Roboto" panose="02000000000000000000" pitchFamily="2" charset="0"/>
+                          <a:ea typeface="Roboto" panose="02000000000000000000" pitchFamily="2" charset="0"/>
+                        </a:rPr>
+                        <a:t>FindLast</a:t>
+                      </a:r>
+                      <a:r>
+                        <a:rPr lang="en-US" sz="1400" b="1" dirty="0">
+                          <a:latin typeface="Roboto" panose="02000000000000000000" pitchFamily="2" charset="0"/>
+                          <a:ea typeface="Roboto" panose="02000000000000000000" pitchFamily="2" charset="0"/>
+                        </a:rPr>
+                        <a:t>(</a:t>
+                      </a:r>
+                      <a:r>
+                        <a:rPr lang="en-US" sz="1400" b="0" dirty="0">
+                          <a:latin typeface="Roboto" panose="02000000000000000000" pitchFamily="2" charset="0"/>
+                          <a:ea typeface="Roboto" panose="02000000000000000000" pitchFamily="2" charset="0"/>
+                        </a:rPr>
+                        <a:t>T value</a:t>
+                      </a:r>
+                      <a:r>
+                        <a:rPr lang="en-US" sz="1400" b="1" dirty="0">
+                          <a:latin typeface="Roboto" panose="02000000000000000000" pitchFamily="2" charset="0"/>
+                          <a:ea typeface="Roboto" panose="02000000000000000000" pitchFamily="2" charset="0"/>
+                        </a:rPr>
+                        <a:t>)</a:t>
+                      </a:r>
+                    </a:p>
+                  </a:txBody>
+                  <a:tcPr/>
+                </a:tc>
+                <a:tc>
+                  <a:txBody>
+                    <a:bodyPr/>
+                    <a:lstStyle/>
+                    <a:p>
+                      <a:r>
+                        <a:rPr lang="en-US" sz="1400" dirty="0">
+                          <a:latin typeface="Roboto" panose="02000000000000000000" pitchFamily="2" charset="0"/>
+                          <a:ea typeface="Roboto" panose="02000000000000000000" pitchFamily="2" charset="0"/>
+                        </a:rPr>
+                        <a:t>Finds the last node containing the specified value. Returns null if not found.</a:t>
+                      </a:r>
+                    </a:p>
+                  </a:txBody>
+                  <a:tcPr/>
+                </a:tc>
+                <a:extLst>
+                  <a:ext uri="{0D108BD9-81ED-4DB2-BD59-A6C34878D82A}">
+                    <a16:rowId xmlns:a16="http://schemas.microsoft.com/office/drawing/2014/main" val="2040937021"/>
+                  </a:ext>
+                </a:extLst>
+              </a:tr>
+              <a:tr h="480261">
+                <a:tc>
+                  <a:txBody>
+                    <a:bodyPr/>
+                    <a:lstStyle/>
+                    <a:p>
+                      <a:r>
+                        <a:rPr lang="en-US" sz="1400" b="1" dirty="0">
+                          <a:latin typeface="Roboto" panose="02000000000000000000" pitchFamily="2" charset="0"/>
+                          <a:ea typeface="Roboto" panose="02000000000000000000" pitchFamily="2" charset="0"/>
+                        </a:rPr>
+                        <a:t>Remove(</a:t>
+                      </a:r>
+                      <a:r>
+                        <a:rPr lang="en-US" sz="1400" b="0" dirty="0">
+                          <a:latin typeface="Roboto" panose="02000000000000000000" pitchFamily="2" charset="0"/>
+                          <a:ea typeface="Roboto" panose="02000000000000000000" pitchFamily="2" charset="0"/>
+                        </a:rPr>
+                        <a:t>T value</a:t>
+                      </a:r>
+                      <a:r>
+                        <a:rPr lang="en-US" sz="1400" b="1" dirty="0">
+                          <a:latin typeface="Roboto" panose="02000000000000000000" pitchFamily="2" charset="0"/>
+                          <a:ea typeface="Roboto" panose="02000000000000000000" pitchFamily="2" charset="0"/>
+                        </a:rPr>
+                        <a:t>)</a:t>
+                      </a:r>
+                    </a:p>
+                  </a:txBody>
+                  <a:tcPr/>
+                </a:tc>
+                <a:tc>
+                  <a:txBody>
+                    <a:bodyPr/>
+                    <a:lstStyle/>
+                    <a:p>
+                      <a:r>
+                        <a:rPr lang="en-US" sz="1400" dirty="0">
+                          <a:latin typeface="Roboto" panose="02000000000000000000" pitchFamily="2" charset="0"/>
+                          <a:ea typeface="Roboto" panose="02000000000000000000" pitchFamily="2" charset="0"/>
+                        </a:rPr>
+                        <a:t>Removes the first occurrence of the specified value from the LinkedList.</a:t>
+                      </a:r>
+                    </a:p>
+                  </a:txBody>
+                  <a:tcPr/>
+                </a:tc>
+                <a:extLst>
+                  <a:ext uri="{0D108BD9-81ED-4DB2-BD59-A6C34878D82A}">
+                    <a16:rowId xmlns:a16="http://schemas.microsoft.com/office/drawing/2014/main" val="730193730"/>
+                  </a:ext>
+                </a:extLst>
+              </a:tr>
+              <a:tr h="480261">
+                <a:tc>
+                  <a:txBody>
+                    <a:bodyPr/>
+                    <a:lstStyle/>
+                    <a:p>
+                      <a:r>
+                        <a:rPr lang="en-US" sz="1400" b="1" dirty="0" err="1">
+                          <a:latin typeface="Roboto" panose="02000000000000000000" pitchFamily="2" charset="0"/>
+                          <a:ea typeface="Roboto" panose="02000000000000000000" pitchFamily="2" charset="0"/>
+                        </a:rPr>
+                        <a:t>RemoveFirst</a:t>
+                      </a:r>
+                      <a:r>
+                        <a:rPr lang="en-US" sz="1400" b="1" dirty="0">
+                          <a:latin typeface="Roboto" panose="02000000000000000000" pitchFamily="2" charset="0"/>
+                          <a:ea typeface="Roboto" panose="02000000000000000000" pitchFamily="2" charset="0"/>
+                        </a:rPr>
+                        <a:t>()</a:t>
+                      </a:r>
+                    </a:p>
+                  </a:txBody>
+                  <a:tcPr/>
+                </a:tc>
+                <a:tc>
+                  <a:txBody>
+                    <a:bodyPr/>
+                    <a:lstStyle/>
+                    <a:p>
+                      <a:r>
+                        <a:rPr lang="en-US" sz="1400" dirty="0">
+                          <a:latin typeface="Roboto" panose="02000000000000000000" pitchFamily="2" charset="0"/>
+                          <a:ea typeface="Roboto" panose="02000000000000000000" pitchFamily="2" charset="0"/>
+                        </a:rPr>
+                        <a:t>Removes the first node of the LinkedList.</a:t>
+                      </a:r>
+                    </a:p>
+                  </a:txBody>
+                  <a:tcPr/>
+                </a:tc>
+                <a:extLst>
+                  <a:ext uri="{0D108BD9-81ED-4DB2-BD59-A6C34878D82A}">
+                    <a16:rowId xmlns:a16="http://schemas.microsoft.com/office/drawing/2014/main" val="766599632"/>
+                  </a:ext>
+                </a:extLst>
+              </a:tr>
+              <a:tr h="480261">
+                <a:tc>
+                  <a:txBody>
+                    <a:bodyPr/>
+                    <a:lstStyle/>
+                    <a:p>
+                      <a:r>
+                        <a:rPr lang="en-US" sz="1400" b="1" dirty="0" err="1">
+                          <a:latin typeface="Roboto" panose="02000000000000000000" pitchFamily="2" charset="0"/>
+                          <a:ea typeface="Roboto" panose="02000000000000000000" pitchFamily="2" charset="0"/>
+                        </a:rPr>
+                        <a:t>RemoveLast</a:t>
+                      </a:r>
+                      <a:r>
+                        <a:rPr lang="en-US" sz="1400" b="1" dirty="0">
+                          <a:latin typeface="Roboto" panose="02000000000000000000" pitchFamily="2" charset="0"/>
+                          <a:ea typeface="Roboto" panose="02000000000000000000" pitchFamily="2" charset="0"/>
+                        </a:rPr>
+                        <a:t>()</a:t>
+                      </a:r>
+                    </a:p>
+                  </a:txBody>
+                  <a:tcPr/>
+                </a:tc>
+                <a:tc>
+                  <a:txBody>
+                    <a:bodyPr/>
+                    <a:lstStyle/>
+                    <a:p>
+                      <a:r>
+                        <a:rPr lang="en-US" sz="1400" dirty="0">
+                          <a:latin typeface="Roboto" panose="02000000000000000000" pitchFamily="2" charset="0"/>
+                          <a:ea typeface="Roboto" panose="02000000000000000000" pitchFamily="2" charset="0"/>
+                        </a:rPr>
+                        <a:t>Removes the last node of the LinkedList.</a:t>
+                      </a:r>
+                    </a:p>
+                  </a:txBody>
+                  <a:tcPr/>
+                </a:tc>
+                <a:extLst>
+                  <a:ext uri="{0D108BD9-81ED-4DB2-BD59-A6C34878D82A}">
+                    <a16:rowId xmlns:a16="http://schemas.microsoft.com/office/drawing/2014/main" val="1805840993"/>
+                  </a:ext>
+                </a:extLst>
+              </a:tr>
+            </a:tbl>
+          </a:graphicData>
+        </a:graphic>
+      </p:graphicFrame>
+    </p:spTree>
+    <p:extLst>
+      <p:ext uri="{BB962C8B-B14F-4D97-AF65-F5344CB8AC3E}">
+        <p14:creationId xmlns:p14="http://schemas.microsoft.com/office/powerpoint/2010/main" val="84061982"/>
+      </p:ext>
+    </p:extLst>
+  </p:cSld>
+  <p:clrMapOvr>
+    <a:masterClrMapping/>
+  </p:clrMapOvr>
+</p:sld>
+</file>
+
+<file path=ppt/slides/slide13.xml><?xml version="1.0" encoding="utf-8"?>
+<p:sld xmlns:a="http://schemas.openxmlformats.org/drawingml/2006/main" xmlns:r="http://schemas.openxmlformats.org/officeDocument/2006/relationships" xmlns:p="http://schemas.openxmlformats.org/presentationml/2006/main">
+  <p:cSld>
+    <p:bg>
+      <p:bgPr>
+        <a:solidFill>
+          <a:schemeClr val="bg1"/>
+        </a:solidFill>
+        <a:effectLst/>
+      </p:bgPr>
+    </p:bg>
+    <p:spTree>
+      <p:nvGrpSpPr>
+        <p:cNvPr id="1" name="">
+          <a:extLst>
+            <a:ext uri="{FF2B5EF4-FFF2-40B4-BE49-F238E27FC236}">
+              <a16:creationId xmlns:a16="http://schemas.microsoft.com/office/drawing/2014/main" id="{00A59487-D9A1-C6DA-DD21-673DB263CC49}"/>
+            </a:ext>
+          </a:extLst>
+        </p:cNvPr>
+        <p:cNvGrpSpPr/>
+        <p:nvPr/>
+      </p:nvGrpSpPr>
+      <p:grpSpPr>
+        <a:xfrm>
+          <a:off x="0" y="0"/>
+          <a:ext cx="0" cy="0"/>
+          <a:chOff x="0" y="0"/>
+          <a:chExt cx="0" cy="0"/>
+        </a:xfrm>
+      </p:grpSpPr>
+      <p:sp useBgFill="1">
+        <p:nvSpPr>
+          <p:cNvPr id="10" name="Rectangle 9">
+            <a:extLst>
+              <a:ext uri="{FF2B5EF4-FFF2-40B4-BE49-F238E27FC236}">
+                <a16:creationId xmlns:a16="http://schemas.microsoft.com/office/drawing/2014/main" id="{D82E1C2B-18AF-6356-9205-510F707FCC91}"/>
+              </a:ext>
+              <a:ext uri="{C183D7F6-B498-43B3-948B-1728B52AA6E4}">
+                <adec:decorative xmlns:adec="http://schemas.microsoft.com/office/drawing/2017/decorative" val="1"/>
+              </a:ext>
+            </a:extLst>
+          </p:cNvPr>
+          <p:cNvSpPr>
+            <a:spLocks noGrp="1" noRot="1" noChangeAspect="1" noMove="1" noResize="1" noEditPoints="1" noAdjustHandles="1" noChangeArrowheads="1" noChangeShapeType="1" noTextEdit="1"/>
+          </p:cNvSpPr>
+          <p:nvPr>
+            <p:extLst>
+              <p:ext uri="{386F3935-93C4-4BCD-93E2-E3B085C9AB24}">
+                <p16:designElem xmlns:p16="http://schemas.microsoft.com/office/powerpoint/2015/main" val="1"/>
+              </p:ext>
+            </p:extLst>
+          </p:nvPr>
+        </p:nvSpPr>
+        <p:spPr>
+          <a:xfrm>
+            <a:off x="0" y="0"/>
+            <a:ext cx="12188952" cy="6858000"/>
+          </a:xfrm>
+          <a:prstGeom prst="rect">
+            <a:avLst/>
+          </a:prstGeom>
+          <a:ln>
+            <a:noFill/>
+          </a:ln>
+        </p:spPr>
+        <p:style>
+          <a:lnRef idx="2">
+            <a:schemeClr val="accent1">
+              <a:shade val="50000"/>
+            </a:schemeClr>
+          </a:lnRef>
+          <a:fillRef idx="1">
+            <a:schemeClr val="accent1"/>
+          </a:fillRef>
+          <a:effectRef idx="0">
+            <a:schemeClr val="accent1"/>
+          </a:effectRef>
+          <a:fontRef idx="minor">
+            <a:schemeClr val="lt1"/>
+          </a:fontRef>
+        </p:style>
+        <p:txBody>
+          <a:bodyPr rtlCol="0" anchor="ctr"/>
+          <a:lstStyle/>
+          <a:p>
+            <a:pPr algn="ctr"/>
+            <a:endParaRPr lang="en-US"/>
+          </a:p>
+        </p:txBody>
+      </p:sp>
+      <p:sp>
+        <p:nvSpPr>
+          <p:cNvPr id="6" name="TextBox 5">
+            <a:extLst>
+              <a:ext uri="{FF2B5EF4-FFF2-40B4-BE49-F238E27FC236}">
+                <a16:creationId xmlns:a16="http://schemas.microsoft.com/office/drawing/2014/main" id="{0B1085E8-DA47-61CF-7E2A-946650863DF4}"/>
+              </a:ext>
+            </a:extLst>
+          </p:cNvPr>
+          <p:cNvSpPr txBox="1"/>
+          <p:nvPr/>
+        </p:nvSpPr>
+        <p:spPr>
+          <a:xfrm>
+            <a:off x="815825" y="851228"/>
+            <a:ext cx="8118625" cy="830997"/>
+          </a:xfrm>
+          <a:prstGeom prst="rect">
+            <a:avLst/>
+          </a:prstGeom>
+          <a:noFill/>
+        </p:spPr>
+        <p:txBody>
+          <a:bodyPr wrap="square" rtlCol="0">
+            <a:spAutoFit/>
+          </a:bodyPr>
+          <a:lstStyle/>
+          <a:p>
+            <a:r>
+              <a:rPr lang="en-US" sz="4800" dirty="0">
+                <a:solidFill>
+                  <a:schemeClr val="accent2"/>
+                </a:solidFill>
+                <a:latin typeface="Roboto Black" panose="02000000000000000000" pitchFamily="2" charset="0"/>
+                <a:ea typeface="Roboto Black" panose="02000000000000000000" pitchFamily="2" charset="0"/>
+              </a:rPr>
+              <a:t>Stack&lt;T&gt;</a:t>
+            </a:r>
+          </a:p>
+        </p:txBody>
+      </p:sp>
+      <p:sp>
+        <p:nvSpPr>
+          <p:cNvPr id="7" name="TextBox 6">
+            <a:extLst>
+              <a:ext uri="{FF2B5EF4-FFF2-40B4-BE49-F238E27FC236}">
+                <a16:creationId xmlns:a16="http://schemas.microsoft.com/office/drawing/2014/main" id="{9117F324-4B5E-04AE-0EBA-D4912CC62785}"/>
+              </a:ext>
+            </a:extLst>
+          </p:cNvPr>
+          <p:cNvSpPr txBox="1"/>
+          <p:nvPr/>
+        </p:nvSpPr>
+        <p:spPr>
+          <a:xfrm>
+            <a:off x="792227" y="1754346"/>
+            <a:ext cx="6771168" cy="2554545"/>
+          </a:xfrm>
+          <a:prstGeom prst="rect">
+            <a:avLst/>
+          </a:prstGeom>
+          <a:noFill/>
+        </p:spPr>
+        <p:txBody>
+          <a:bodyPr wrap="square" rtlCol="0">
+            <a:spAutoFit/>
+          </a:bodyPr>
+          <a:lstStyle/>
+          <a:p>
+            <a:r>
+              <a:rPr lang="en-US" sz="1600" dirty="0">
+                <a:latin typeface="-apple-system"/>
+                <a:ea typeface="Roboto" panose="02000000000000000000" pitchFamily="2" charset="0"/>
+              </a:rPr>
+              <a:t>A stack is a </a:t>
+            </a:r>
+            <a:r>
+              <a:rPr lang="en-US" sz="1600" b="1" dirty="0">
+                <a:solidFill>
+                  <a:schemeClr val="accent5"/>
+                </a:solidFill>
+                <a:latin typeface="-apple-system"/>
+                <a:ea typeface="Roboto" panose="02000000000000000000" pitchFamily="2" charset="0"/>
+              </a:rPr>
+              <a:t>Last In, First Out (LIFO) </a:t>
+            </a:r>
+            <a:r>
+              <a:rPr lang="en-US" sz="1600" dirty="0">
+                <a:latin typeface="-apple-system"/>
+                <a:ea typeface="Roboto" panose="02000000000000000000" pitchFamily="2" charset="0"/>
+              </a:rPr>
+              <a:t>collection, meaning the last item added is the first one to be removed. </a:t>
+            </a:r>
+            <a:endParaRPr lang="en-US" sz="1600" b="1" dirty="0">
+              <a:latin typeface="-apple-system"/>
+              <a:ea typeface="Roboto" panose="02000000000000000000" pitchFamily="2" charset="0"/>
+            </a:endParaRPr>
+          </a:p>
+          <a:p>
+            <a:endParaRPr lang="en-US" sz="1600" b="1" dirty="0">
+              <a:latin typeface="-apple-system"/>
+              <a:ea typeface="Roboto" panose="02000000000000000000" pitchFamily="2" charset="0"/>
+            </a:endParaRPr>
+          </a:p>
+          <a:p>
+            <a:endParaRPr lang="en-US" sz="1600" b="1" dirty="0">
+              <a:latin typeface="-apple-system"/>
+              <a:ea typeface="Roboto" panose="02000000000000000000" pitchFamily="2" charset="0"/>
+            </a:endParaRPr>
+          </a:p>
+          <a:p>
+            <a:endParaRPr lang="en-US" sz="1600" b="1" dirty="0">
+              <a:latin typeface="-apple-system"/>
+              <a:ea typeface="Roboto" panose="02000000000000000000" pitchFamily="2" charset="0"/>
+            </a:endParaRPr>
+          </a:p>
+          <a:p>
+            <a:endParaRPr lang="en-US" sz="1600" b="1" dirty="0">
+              <a:latin typeface="-apple-system"/>
+              <a:ea typeface="Roboto" panose="02000000000000000000" pitchFamily="2" charset="0"/>
+            </a:endParaRPr>
+          </a:p>
+          <a:p>
+            <a:r>
+              <a:rPr lang="en-US" sz="1600" b="1" dirty="0">
+                <a:latin typeface="-apple-system"/>
+                <a:ea typeface="Roboto" panose="02000000000000000000" pitchFamily="2" charset="0"/>
+              </a:rPr>
+              <a:t>Properties and Methods</a:t>
+            </a:r>
+          </a:p>
+          <a:p>
+            <a:pPr marL="285750" indent="-285750">
+              <a:buFont typeface="Arial" panose="020B0604020202020204" pitchFamily="34" charset="0"/>
+              <a:buChar char="•"/>
+            </a:pPr>
+            <a:endParaRPr lang="en-US" sz="1600" b="1" dirty="0">
+              <a:latin typeface="-apple-system"/>
+              <a:ea typeface="Roboto" panose="02000000000000000000" pitchFamily="2" charset="0"/>
+            </a:endParaRPr>
+          </a:p>
+          <a:p>
+            <a:pPr marL="285750" indent="-285750">
+              <a:buFont typeface="Arial" panose="020B0604020202020204" pitchFamily="34" charset="0"/>
+              <a:buChar char="•"/>
+            </a:pPr>
+            <a:endParaRPr lang="en-US" sz="1600" dirty="0">
+              <a:latin typeface="-apple-system"/>
+              <a:ea typeface="Roboto" panose="02000000000000000000" pitchFamily="2" charset="0"/>
+            </a:endParaRPr>
+          </a:p>
+          <a:p>
+            <a:pPr marL="285750" indent="-285750">
+              <a:buFont typeface="Arial" panose="020B0604020202020204" pitchFamily="34" charset="0"/>
+              <a:buChar char="•"/>
+            </a:pPr>
+            <a:endParaRPr lang="en-US" sz="1600" dirty="0">
+              <a:latin typeface="-apple-system"/>
+              <a:ea typeface="Roboto" panose="02000000000000000000" pitchFamily="2" charset="0"/>
+            </a:endParaRPr>
+          </a:p>
+        </p:txBody>
+      </p:sp>
+      <p:graphicFrame>
+        <p:nvGraphicFramePr>
+          <p:cNvPr id="2" name="Table 1">
+            <a:extLst>
+              <a:ext uri="{FF2B5EF4-FFF2-40B4-BE49-F238E27FC236}">
+                <a16:creationId xmlns:a16="http://schemas.microsoft.com/office/drawing/2014/main" id="{BAE9A0EA-7DF2-EDEC-92F1-44169448370D}"/>
+              </a:ext>
+            </a:extLst>
+          </p:cNvPr>
+          <p:cNvGraphicFramePr>
+            <a:graphicFrameLocks noGrp="1"/>
+          </p:cNvGraphicFramePr>
+          <p:nvPr/>
+        </p:nvGraphicFramePr>
+        <p:xfrm>
+          <a:off x="792226" y="3781844"/>
+          <a:ext cx="10604500" cy="2249606"/>
+        </p:xfrm>
+        <a:graphic>
+          <a:graphicData uri="http://schemas.openxmlformats.org/drawingml/2006/table">
+            <a:tbl>
+              <a:tblPr firstRow="1" bandRow="1">
+                <a:tableStyleId>{5C22544A-7EE6-4342-B048-85BDC9FD1C3A}</a:tableStyleId>
+              </a:tblPr>
+              <a:tblGrid>
+                <a:gridCol w="5302250">
+                  <a:extLst>
+                    <a:ext uri="{9D8B030D-6E8A-4147-A177-3AD203B41FA5}">
+                      <a16:colId xmlns:a16="http://schemas.microsoft.com/office/drawing/2014/main" val="3479775401"/>
+                    </a:ext>
+                  </a:extLst>
+                </a:gridCol>
+                <a:gridCol w="5302250">
+                  <a:extLst>
+                    <a:ext uri="{9D8B030D-6E8A-4147-A177-3AD203B41FA5}">
+                      <a16:colId xmlns:a16="http://schemas.microsoft.com/office/drawing/2014/main" val="954773244"/>
+                    </a:ext>
+                  </a:extLst>
+                </a:gridCol>
+              </a:tblGrid>
+              <a:tr h="296714">
+                <a:tc>
+                  <a:txBody>
+                    <a:bodyPr/>
+                    <a:lstStyle/>
+                    <a:p>
+                      <a:r>
+                        <a:rPr lang="en-US" sz="1400" dirty="0">
+                          <a:latin typeface="Roboto" panose="02000000000000000000" pitchFamily="2" charset="0"/>
+                          <a:ea typeface="Roboto" panose="02000000000000000000" pitchFamily="2" charset="0"/>
+                        </a:rPr>
+                        <a:t>Property / Method</a:t>
+                      </a:r>
+                    </a:p>
+                  </a:txBody>
+                  <a:tcPr/>
+                </a:tc>
+                <a:tc>
+                  <a:txBody>
+                    <a:bodyPr/>
+                    <a:lstStyle/>
+                    <a:p>
+                      <a:r>
+                        <a:rPr lang="en-US" sz="1400" dirty="0">
+                          <a:latin typeface="Roboto" panose="02000000000000000000" pitchFamily="2" charset="0"/>
+                          <a:ea typeface="Roboto" panose="02000000000000000000" pitchFamily="2" charset="0"/>
+                        </a:rPr>
+                        <a:t>Description</a:t>
+                      </a:r>
+                    </a:p>
+                  </a:txBody>
+                  <a:tcPr/>
+                </a:tc>
+                <a:extLst>
+                  <a:ext uri="{0D108BD9-81ED-4DB2-BD59-A6C34878D82A}">
+                    <a16:rowId xmlns:a16="http://schemas.microsoft.com/office/drawing/2014/main" val="412094397"/>
+                  </a:ext>
+                </a:extLst>
+              </a:tr>
+              <a:tr h="454243">
+                <a:tc>
+                  <a:txBody>
+                    <a:bodyPr/>
+                    <a:lstStyle/>
+                    <a:p>
+                      <a:r>
+                        <a:rPr lang="en-US" sz="1400" b="1" dirty="0">
+                          <a:latin typeface="Roboto" panose="02000000000000000000" pitchFamily="2" charset="0"/>
+                          <a:ea typeface="Roboto" panose="02000000000000000000" pitchFamily="2" charset="0"/>
+                        </a:rPr>
+                        <a:t>Count</a:t>
+                      </a:r>
+                    </a:p>
+                  </a:txBody>
+                  <a:tcPr/>
+                </a:tc>
+                <a:tc>
+                  <a:txBody>
+                    <a:bodyPr/>
+                    <a:lstStyle/>
+                    <a:p>
+                      <a:r>
+                        <a:rPr lang="en-US" sz="1400" dirty="0">
+                          <a:latin typeface="Roboto" panose="02000000000000000000" pitchFamily="2" charset="0"/>
+                          <a:ea typeface="Roboto" panose="02000000000000000000" pitchFamily="2" charset="0"/>
+                        </a:rPr>
+                        <a:t>Gets the number of elements in the stack.</a:t>
+                      </a:r>
+                    </a:p>
+                  </a:txBody>
+                  <a:tcPr/>
+                </a:tc>
+                <a:extLst>
+                  <a:ext uri="{0D108BD9-81ED-4DB2-BD59-A6C34878D82A}">
+                    <a16:rowId xmlns:a16="http://schemas.microsoft.com/office/drawing/2014/main" val="3203117005"/>
+                  </a:ext>
+                </a:extLst>
+              </a:tr>
+              <a:tr h="454243">
+                <a:tc>
+                  <a:txBody>
+                    <a:bodyPr/>
+                    <a:lstStyle/>
+                    <a:p>
+                      <a:r>
+                        <a:rPr lang="en-US" sz="1400" b="1" dirty="0">
+                          <a:latin typeface="Roboto" panose="02000000000000000000" pitchFamily="2" charset="0"/>
+                          <a:ea typeface="Roboto" panose="02000000000000000000" pitchFamily="2" charset="0"/>
+                        </a:rPr>
+                        <a:t>Clear()</a:t>
+                      </a:r>
+                    </a:p>
+                  </a:txBody>
+                  <a:tcPr/>
+                </a:tc>
+                <a:tc>
+                  <a:txBody>
+                    <a:bodyPr/>
+                    <a:lstStyle/>
+                    <a:p>
+                      <a:r>
+                        <a:rPr lang="en-US" sz="1400" dirty="0">
+                          <a:latin typeface="Roboto" panose="02000000000000000000" pitchFamily="2" charset="0"/>
+                          <a:ea typeface="Roboto" panose="02000000000000000000" pitchFamily="2" charset="0"/>
+                        </a:rPr>
+                        <a:t>Removes all elements from the stack.</a:t>
+                      </a:r>
+                    </a:p>
+                  </a:txBody>
+                  <a:tcPr/>
+                </a:tc>
+                <a:extLst>
+                  <a:ext uri="{0D108BD9-81ED-4DB2-BD59-A6C34878D82A}">
+                    <a16:rowId xmlns:a16="http://schemas.microsoft.com/office/drawing/2014/main" val="1108414833"/>
+                  </a:ext>
+                </a:extLst>
+              </a:tr>
+              <a:tr h="454243">
+                <a:tc>
+                  <a:txBody>
+                    <a:bodyPr/>
+                    <a:lstStyle/>
+                    <a:p>
+                      <a:r>
+                        <a:rPr lang="en-US" sz="1400" b="1" dirty="0">
+                          <a:latin typeface="Roboto" panose="02000000000000000000" pitchFamily="2" charset="0"/>
+                          <a:ea typeface="Roboto" panose="02000000000000000000" pitchFamily="2" charset="0"/>
+                        </a:rPr>
+                        <a:t>Contains(</a:t>
+                      </a:r>
+                      <a:r>
+                        <a:rPr lang="en-US" sz="1400" b="0" dirty="0">
+                          <a:latin typeface="Roboto" panose="02000000000000000000" pitchFamily="2" charset="0"/>
+                          <a:ea typeface="Roboto" panose="02000000000000000000" pitchFamily="2" charset="0"/>
+                        </a:rPr>
+                        <a:t>T item</a:t>
+                      </a:r>
+                      <a:r>
+                        <a:rPr lang="en-US" sz="1400" b="1" dirty="0">
+                          <a:latin typeface="Roboto" panose="02000000000000000000" pitchFamily="2" charset="0"/>
+                          <a:ea typeface="Roboto" panose="02000000000000000000" pitchFamily="2" charset="0"/>
+                        </a:rPr>
+                        <a:t>)</a:t>
+                      </a:r>
+                    </a:p>
+                  </a:txBody>
+                  <a:tcPr/>
+                </a:tc>
+                <a:tc>
+                  <a:txBody>
+                    <a:bodyPr/>
+                    <a:lstStyle/>
+                    <a:p>
+                      <a:r>
+                        <a:rPr lang="en-US" sz="1400" dirty="0">
+                          <a:latin typeface="Roboto" panose="02000000000000000000" pitchFamily="2" charset="0"/>
+                          <a:ea typeface="Roboto" panose="02000000000000000000" pitchFamily="2" charset="0"/>
+                        </a:rPr>
+                        <a:t>Checks if a specific item exists in the stack, returning true if found.</a:t>
+                      </a:r>
+                    </a:p>
+                  </a:txBody>
+                  <a:tcPr/>
+                </a:tc>
+                <a:extLst>
+                  <a:ext uri="{0D108BD9-81ED-4DB2-BD59-A6C34878D82A}">
+                    <a16:rowId xmlns:a16="http://schemas.microsoft.com/office/drawing/2014/main" val="3710949462"/>
+                  </a:ext>
+                </a:extLst>
+              </a:tr>
+              <a:tr h="504414">
+                <a:tc>
+                  <a:txBody>
+                    <a:bodyPr/>
+                    <a:lstStyle/>
+                    <a:p>
+                      <a:r>
+                        <a:rPr lang="en-US" sz="1400" b="1" dirty="0" err="1">
+                          <a:latin typeface="Roboto" panose="02000000000000000000" pitchFamily="2" charset="0"/>
+                          <a:ea typeface="Roboto" panose="02000000000000000000" pitchFamily="2" charset="0"/>
+                        </a:rPr>
+                        <a:t>CopyTo</a:t>
+                      </a:r>
+                      <a:r>
+                        <a:rPr lang="en-US" sz="1400" b="1" dirty="0">
+                          <a:latin typeface="Roboto" panose="02000000000000000000" pitchFamily="2" charset="0"/>
+                          <a:ea typeface="Roboto" panose="02000000000000000000" pitchFamily="2" charset="0"/>
+                        </a:rPr>
+                        <a:t>(</a:t>
+                      </a:r>
+                      <a:r>
+                        <a:rPr lang="en-US" sz="1400" b="0" dirty="0">
+                          <a:latin typeface="Roboto" panose="02000000000000000000" pitchFamily="2" charset="0"/>
+                          <a:ea typeface="Roboto" panose="02000000000000000000" pitchFamily="2" charset="0"/>
+                        </a:rPr>
+                        <a:t>T [ ] array, int index</a:t>
+                      </a:r>
+                      <a:r>
+                        <a:rPr lang="en-US" sz="1400" b="1" dirty="0">
+                          <a:latin typeface="Roboto" panose="02000000000000000000" pitchFamily="2" charset="0"/>
+                          <a:ea typeface="Roboto" panose="02000000000000000000" pitchFamily="2" charset="0"/>
+                        </a:rPr>
+                        <a:t>)</a:t>
+                      </a:r>
+                    </a:p>
+                  </a:txBody>
+                  <a:tcPr/>
+                </a:tc>
+                <a:tc>
+                  <a:txBody>
+                    <a:bodyPr/>
+                    <a:lstStyle/>
+                    <a:p>
+                      <a:r>
+                        <a:rPr lang="en-US" sz="1400" dirty="0">
+                          <a:latin typeface="Roboto" panose="02000000000000000000" pitchFamily="2" charset="0"/>
+                          <a:ea typeface="Roboto" panose="02000000000000000000" pitchFamily="2" charset="0"/>
+                        </a:rPr>
+                        <a:t>Copies the elements of the stack into an existing array starting at the specified index.</a:t>
+                      </a:r>
+                    </a:p>
+                  </a:txBody>
+                  <a:tcPr/>
+                </a:tc>
+                <a:extLst>
+                  <a:ext uri="{0D108BD9-81ED-4DB2-BD59-A6C34878D82A}">
+                    <a16:rowId xmlns:a16="http://schemas.microsoft.com/office/drawing/2014/main" val="677495998"/>
+                  </a:ext>
+                </a:extLst>
+              </a:tr>
+            </a:tbl>
+          </a:graphicData>
+        </a:graphic>
+      </p:graphicFrame>
+      <p:pic>
+        <p:nvPicPr>
+          <p:cNvPr id="4" name="Picture 3">
+            <a:extLst>
+              <a:ext uri="{FF2B5EF4-FFF2-40B4-BE49-F238E27FC236}">
+                <a16:creationId xmlns:a16="http://schemas.microsoft.com/office/drawing/2014/main" id="{E8060D0E-2E94-192E-DDA5-5C91C014B323}"/>
+              </a:ext>
+            </a:extLst>
+          </p:cNvPr>
+          <p:cNvPicPr>
+            <a:picLocks noChangeAspect="1"/>
+          </p:cNvPicPr>
+          <p:nvPr/>
+        </p:nvPicPr>
+        <p:blipFill>
+          <a:blip r:embed="rId2"/>
+          <a:stretch>
+            <a:fillRect/>
+          </a:stretch>
+        </p:blipFill>
+        <p:spPr>
+          <a:xfrm>
+            <a:off x="7926457" y="951003"/>
+            <a:ext cx="3449718" cy="2517361"/>
+          </a:xfrm>
+          <a:prstGeom prst="rect">
+            <a:avLst/>
+          </a:prstGeom>
+        </p:spPr>
+      </p:pic>
+    </p:spTree>
+    <p:extLst>
+      <p:ext uri="{BB962C8B-B14F-4D97-AF65-F5344CB8AC3E}">
+        <p14:creationId xmlns:p14="http://schemas.microsoft.com/office/powerpoint/2010/main" val="2172245569"/>
+      </p:ext>
+    </p:extLst>
+  </p:cSld>
+  <p:clrMapOvr>
+    <a:masterClrMapping/>
+  </p:clrMapOvr>
+</p:sld>
+</file>
+
+<file path=ppt/slides/slide14.xml><?xml version="1.0" encoding="utf-8"?>
+<p:sld xmlns:a="http://schemas.openxmlformats.org/drawingml/2006/main" xmlns:r="http://schemas.openxmlformats.org/officeDocument/2006/relationships" xmlns:p="http://schemas.openxmlformats.org/presentationml/2006/main">
+  <p:cSld>
+    <p:bg>
+      <p:bgPr>
+        <a:solidFill>
+          <a:schemeClr val="bg1"/>
+        </a:solidFill>
+        <a:effectLst/>
+      </p:bgPr>
+    </p:bg>
+    <p:spTree>
+      <p:nvGrpSpPr>
+        <p:cNvPr id="1" name="">
+          <a:extLst>
+            <a:ext uri="{FF2B5EF4-FFF2-40B4-BE49-F238E27FC236}">
+              <a16:creationId xmlns:a16="http://schemas.microsoft.com/office/drawing/2014/main" id="{F882FD4D-61C2-FE57-76A8-F112C8D97B5A}"/>
+            </a:ext>
+          </a:extLst>
+        </p:cNvPr>
+        <p:cNvGrpSpPr/>
+        <p:nvPr/>
+      </p:nvGrpSpPr>
+      <p:grpSpPr>
+        <a:xfrm>
+          <a:off x="0" y="0"/>
+          <a:ext cx="0" cy="0"/>
+          <a:chOff x="0" y="0"/>
+          <a:chExt cx="0" cy="0"/>
+        </a:xfrm>
+      </p:grpSpPr>
+      <p:sp useBgFill="1">
+        <p:nvSpPr>
+          <p:cNvPr id="10" name="Rectangle 9">
+            <a:extLst>
+              <a:ext uri="{FF2B5EF4-FFF2-40B4-BE49-F238E27FC236}">
+                <a16:creationId xmlns:a16="http://schemas.microsoft.com/office/drawing/2014/main" id="{5CF8973B-E8EE-72F2-20DE-FBEFE5CB88C4}"/>
+              </a:ext>
+              <a:ext uri="{C183D7F6-B498-43B3-948B-1728B52AA6E4}">
+                <adec:decorative xmlns:adec="http://schemas.microsoft.com/office/drawing/2017/decorative" val="1"/>
+              </a:ext>
+            </a:extLst>
+          </p:cNvPr>
+          <p:cNvSpPr>
+            <a:spLocks noGrp="1" noRot="1" noChangeAspect="1" noMove="1" noResize="1" noEditPoints="1" noAdjustHandles="1" noChangeArrowheads="1" noChangeShapeType="1" noTextEdit="1"/>
+          </p:cNvSpPr>
+          <p:nvPr>
+            <p:extLst>
+              <p:ext uri="{386F3935-93C4-4BCD-93E2-E3B085C9AB24}">
+                <p16:designElem xmlns:p16="http://schemas.microsoft.com/office/powerpoint/2015/main" val="1"/>
+              </p:ext>
+            </p:extLst>
+          </p:nvPr>
+        </p:nvSpPr>
+        <p:spPr>
+          <a:xfrm>
+            <a:off x="0" y="0"/>
+            <a:ext cx="12188952" cy="6858000"/>
+          </a:xfrm>
+          <a:prstGeom prst="rect">
+            <a:avLst/>
+          </a:prstGeom>
+          <a:ln>
+            <a:noFill/>
+          </a:ln>
+        </p:spPr>
+        <p:style>
+          <a:lnRef idx="2">
+            <a:schemeClr val="accent1">
+              <a:shade val="50000"/>
+            </a:schemeClr>
+          </a:lnRef>
+          <a:fillRef idx="1">
+            <a:schemeClr val="accent1"/>
+          </a:fillRef>
+          <a:effectRef idx="0">
+            <a:schemeClr val="accent1"/>
+          </a:effectRef>
+          <a:fontRef idx="minor">
+            <a:schemeClr val="lt1"/>
+          </a:fontRef>
+        </p:style>
+        <p:txBody>
+          <a:bodyPr rtlCol="0" anchor="ctr"/>
+          <a:lstStyle/>
+          <a:p>
+            <a:pPr algn="ctr"/>
+            <a:endParaRPr lang="en-US"/>
+          </a:p>
+        </p:txBody>
+      </p:sp>
+      <p:graphicFrame>
+        <p:nvGraphicFramePr>
+          <p:cNvPr id="2" name="Table 1">
+            <a:extLst>
+              <a:ext uri="{FF2B5EF4-FFF2-40B4-BE49-F238E27FC236}">
+                <a16:creationId xmlns:a16="http://schemas.microsoft.com/office/drawing/2014/main" id="{D11DC760-3DE6-06AE-F23C-EC3DF4713172}"/>
+              </a:ext>
+            </a:extLst>
+          </p:cNvPr>
+          <p:cNvGraphicFramePr>
+            <a:graphicFrameLocks noGrp="1"/>
+          </p:cNvGraphicFramePr>
+          <p:nvPr/>
+        </p:nvGraphicFramePr>
+        <p:xfrm>
+          <a:off x="792226" y="2107003"/>
+          <a:ext cx="10604500" cy="2161889"/>
+        </p:xfrm>
+        <a:graphic>
+          <a:graphicData uri="http://schemas.openxmlformats.org/drawingml/2006/table">
+            <a:tbl>
+              <a:tblPr firstRow="1" bandRow="1">
+                <a:tableStyleId>{5C22544A-7EE6-4342-B048-85BDC9FD1C3A}</a:tableStyleId>
+              </a:tblPr>
+              <a:tblGrid>
+                <a:gridCol w="5302250">
+                  <a:extLst>
+                    <a:ext uri="{9D8B030D-6E8A-4147-A177-3AD203B41FA5}">
+                      <a16:colId xmlns:a16="http://schemas.microsoft.com/office/drawing/2014/main" val="3479775401"/>
+                    </a:ext>
+                  </a:extLst>
+                </a:gridCol>
+                <a:gridCol w="5302250">
+                  <a:extLst>
+                    <a:ext uri="{9D8B030D-6E8A-4147-A177-3AD203B41FA5}">
+                      <a16:colId xmlns:a16="http://schemas.microsoft.com/office/drawing/2014/main" val="954773244"/>
+                    </a:ext>
+                  </a:extLst>
+                </a:gridCol>
+              </a:tblGrid>
+              <a:tr h="282506">
+                <a:tc>
+                  <a:txBody>
+                    <a:bodyPr/>
+                    <a:lstStyle/>
+                    <a:p>
+                      <a:r>
+                        <a:rPr lang="en-US" sz="1400" dirty="0">
+                          <a:latin typeface="Roboto" panose="02000000000000000000" pitchFamily="2" charset="0"/>
+                          <a:ea typeface="Roboto" panose="02000000000000000000" pitchFamily="2" charset="0"/>
+                        </a:rPr>
+                        <a:t>Property / Method</a:t>
+                      </a:r>
+                    </a:p>
+                  </a:txBody>
+                  <a:tcPr/>
+                </a:tc>
+                <a:tc>
+                  <a:txBody>
+                    <a:bodyPr/>
+                    <a:lstStyle/>
+                    <a:p>
+                      <a:r>
+                        <a:rPr lang="en-US" sz="1400" dirty="0">
+                          <a:latin typeface="Roboto" panose="02000000000000000000" pitchFamily="2" charset="0"/>
+                          <a:ea typeface="Roboto" panose="02000000000000000000" pitchFamily="2" charset="0"/>
+                        </a:rPr>
+                        <a:t>Description</a:t>
+                      </a:r>
+                    </a:p>
+                  </a:txBody>
+                  <a:tcPr/>
+                </a:tc>
+                <a:extLst>
+                  <a:ext uri="{0D108BD9-81ED-4DB2-BD59-A6C34878D82A}">
+                    <a16:rowId xmlns:a16="http://schemas.microsoft.com/office/drawing/2014/main" val="412094397"/>
+                  </a:ext>
+                </a:extLst>
+              </a:tr>
+              <a:tr h="416306">
+                <a:tc>
+                  <a:txBody>
+                    <a:bodyPr/>
+                    <a:lstStyle/>
+                    <a:p>
+                      <a:r>
+                        <a:rPr lang="en-US" sz="1400" b="1" dirty="0">
+                          <a:latin typeface="Roboto" panose="02000000000000000000" pitchFamily="2" charset="0"/>
+                          <a:ea typeface="Roboto" panose="02000000000000000000" pitchFamily="2" charset="0"/>
+                        </a:rPr>
+                        <a:t>Peek()</a:t>
+                      </a:r>
+                    </a:p>
+                  </a:txBody>
+                  <a:tcPr/>
+                </a:tc>
+                <a:tc>
+                  <a:txBody>
+                    <a:bodyPr/>
+                    <a:lstStyle/>
+                    <a:p>
+                      <a:r>
+                        <a:rPr lang="en-US" sz="1400" dirty="0">
+                          <a:latin typeface="Roboto" panose="02000000000000000000" pitchFamily="2" charset="0"/>
+                          <a:ea typeface="Roboto" panose="02000000000000000000" pitchFamily="2" charset="0"/>
+                        </a:rPr>
+                        <a:t>Returns the item at the top of the stack without removing it.</a:t>
+                      </a:r>
+                    </a:p>
+                  </a:txBody>
+                  <a:tcPr/>
+                </a:tc>
+                <a:extLst>
+                  <a:ext uri="{0D108BD9-81ED-4DB2-BD59-A6C34878D82A}">
+                    <a16:rowId xmlns:a16="http://schemas.microsoft.com/office/drawing/2014/main" val="890513449"/>
+                  </a:ext>
+                </a:extLst>
+              </a:tr>
+              <a:tr h="480261">
+                <a:tc>
+                  <a:txBody>
+                    <a:bodyPr/>
+                    <a:lstStyle/>
+                    <a:p>
+                      <a:r>
+                        <a:rPr lang="en-US" sz="1400" b="1" dirty="0">
+                          <a:latin typeface="Roboto" panose="02000000000000000000" pitchFamily="2" charset="0"/>
+                          <a:ea typeface="Roboto" panose="02000000000000000000" pitchFamily="2" charset="0"/>
+                        </a:rPr>
+                        <a:t>Pop()</a:t>
+                      </a:r>
+                    </a:p>
+                  </a:txBody>
+                  <a:tcPr/>
+                </a:tc>
+                <a:tc>
+                  <a:txBody>
+                    <a:bodyPr/>
+                    <a:lstStyle/>
+                    <a:p>
+                      <a:r>
+                        <a:rPr lang="en-US" sz="1400" dirty="0">
+                          <a:latin typeface="Roboto" panose="02000000000000000000" pitchFamily="2" charset="0"/>
+                          <a:ea typeface="Roboto" panose="02000000000000000000" pitchFamily="2" charset="0"/>
+                        </a:rPr>
+                        <a:t>Removes and returns the item at the top of the stack.</a:t>
+                      </a:r>
+                    </a:p>
+                  </a:txBody>
+                  <a:tcPr/>
+                </a:tc>
+                <a:extLst>
+                  <a:ext uri="{0D108BD9-81ED-4DB2-BD59-A6C34878D82A}">
+                    <a16:rowId xmlns:a16="http://schemas.microsoft.com/office/drawing/2014/main" val="3203117005"/>
+                  </a:ext>
+                </a:extLst>
+              </a:tr>
+              <a:tr h="480261">
+                <a:tc>
+                  <a:txBody>
+                    <a:bodyPr/>
+                    <a:lstStyle/>
+                    <a:p>
+                      <a:r>
+                        <a:rPr lang="en-US" sz="1400" b="1" dirty="0">
+                          <a:latin typeface="Roboto" panose="02000000000000000000" pitchFamily="2" charset="0"/>
+                          <a:ea typeface="Roboto" panose="02000000000000000000" pitchFamily="2" charset="0"/>
+                        </a:rPr>
+                        <a:t>Push(T item)</a:t>
+                      </a:r>
+                    </a:p>
+                  </a:txBody>
+                  <a:tcPr/>
+                </a:tc>
+                <a:tc>
+                  <a:txBody>
+                    <a:bodyPr/>
+                    <a:lstStyle/>
+                    <a:p>
+                      <a:r>
+                        <a:rPr lang="en-US" sz="1400" dirty="0">
+                          <a:latin typeface="Roboto" panose="02000000000000000000" pitchFamily="2" charset="0"/>
+                          <a:ea typeface="Roboto" panose="02000000000000000000" pitchFamily="2" charset="0"/>
+                        </a:rPr>
+                        <a:t>Adds an item to the top of the stack.</a:t>
+                      </a:r>
+                    </a:p>
+                  </a:txBody>
+                  <a:tcPr/>
+                </a:tc>
+                <a:extLst>
+                  <a:ext uri="{0D108BD9-81ED-4DB2-BD59-A6C34878D82A}">
+                    <a16:rowId xmlns:a16="http://schemas.microsoft.com/office/drawing/2014/main" val="1108414833"/>
+                  </a:ext>
+                </a:extLst>
+              </a:tr>
+              <a:tr h="480261">
+                <a:tc>
+                  <a:txBody>
+                    <a:bodyPr/>
+                    <a:lstStyle/>
+                    <a:p>
+                      <a:r>
+                        <a:rPr lang="en-US" sz="1400" b="1" dirty="0" err="1">
+                          <a:latin typeface="Roboto" panose="02000000000000000000" pitchFamily="2" charset="0"/>
+                          <a:ea typeface="Roboto" panose="02000000000000000000" pitchFamily="2" charset="0"/>
+                        </a:rPr>
+                        <a:t>ToArray</a:t>
+                      </a:r>
+                      <a:r>
+                        <a:rPr lang="en-US" sz="1400" b="1" dirty="0">
+                          <a:latin typeface="Roboto" panose="02000000000000000000" pitchFamily="2" charset="0"/>
+                          <a:ea typeface="Roboto" panose="02000000000000000000" pitchFamily="2" charset="0"/>
+                        </a:rPr>
+                        <a:t>()</a:t>
+                      </a:r>
+                    </a:p>
+                  </a:txBody>
+                  <a:tcPr/>
+                </a:tc>
+                <a:tc>
+                  <a:txBody>
+                    <a:bodyPr/>
+                    <a:lstStyle/>
+                    <a:p>
+                      <a:r>
+                        <a:rPr lang="en-US" sz="1400" dirty="0">
+                          <a:latin typeface="Roboto" panose="02000000000000000000" pitchFamily="2" charset="0"/>
+                          <a:ea typeface="Roboto" panose="02000000000000000000" pitchFamily="2" charset="0"/>
+                        </a:rPr>
+                        <a:t>Copies the stack elements into a new array in LIFO order.</a:t>
+                      </a:r>
+                    </a:p>
+                  </a:txBody>
+                  <a:tcPr/>
+                </a:tc>
+                <a:extLst>
+                  <a:ext uri="{0D108BD9-81ED-4DB2-BD59-A6C34878D82A}">
+                    <a16:rowId xmlns:a16="http://schemas.microsoft.com/office/drawing/2014/main" val="3710949462"/>
+                  </a:ext>
+                </a:extLst>
+              </a:tr>
+            </a:tbl>
+          </a:graphicData>
+        </a:graphic>
+      </p:graphicFrame>
+    </p:spTree>
+    <p:extLst>
+      <p:ext uri="{BB962C8B-B14F-4D97-AF65-F5344CB8AC3E}">
+        <p14:creationId xmlns:p14="http://schemas.microsoft.com/office/powerpoint/2010/main" val="2415292466"/>
+      </p:ext>
+    </p:extLst>
+  </p:cSld>
+  <p:clrMapOvr>
+    <a:masterClrMapping/>
+  </p:clrMapOvr>
+</p:sld>
+</file>
+
+<file path=ppt/slides/slide15.xml><?xml version="1.0" encoding="utf-8"?>
+<p:sld xmlns:a="http://schemas.openxmlformats.org/drawingml/2006/main" xmlns:r="http://schemas.openxmlformats.org/officeDocument/2006/relationships" xmlns:p="http://schemas.openxmlformats.org/presentationml/2006/main">
+  <p:cSld>
+    <p:bg>
+      <p:bgPr>
+        <a:solidFill>
+          <a:schemeClr val="bg1"/>
+        </a:solidFill>
+        <a:effectLst/>
+      </p:bgPr>
+    </p:bg>
+    <p:spTree>
+      <p:nvGrpSpPr>
+        <p:cNvPr id="1" name="">
+          <a:extLst>
+            <a:ext uri="{FF2B5EF4-FFF2-40B4-BE49-F238E27FC236}">
+              <a16:creationId xmlns:a16="http://schemas.microsoft.com/office/drawing/2014/main" id="{ACB524A2-6003-E98E-AD4C-94C33F87349E}"/>
+            </a:ext>
+          </a:extLst>
+        </p:cNvPr>
+        <p:cNvGrpSpPr/>
+        <p:nvPr/>
+      </p:nvGrpSpPr>
+      <p:grpSpPr>
+        <a:xfrm>
+          <a:off x="0" y="0"/>
+          <a:ext cx="0" cy="0"/>
+          <a:chOff x="0" y="0"/>
+          <a:chExt cx="0" cy="0"/>
+        </a:xfrm>
+      </p:grpSpPr>
+      <p:sp useBgFill="1">
+        <p:nvSpPr>
+          <p:cNvPr id="10" name="Rectangle 9">
+            <a:extLst>
+              <a:ext uri="{FF2B5EF4-FFF2-40B4-BE49-F238E27FC236}">
+                <a16:creationId xmlns:a16="http://schemas.microsoft.com/office/drawing/2014/main" id="{9D8AC3A5-C960-2B95-FA3B-12B4166604F5}"/>
+              </a:ext>
+              <a:ext uri="{C183D7F6-B498-43B3-948B-1728B52AA6E4}">
+                <adec:decorative xmlns:adec="http://schemas.microsoft.com/office/drawing/2017/decorative" val="1"/>
+              </a:ext>
+            </a:extLst>
+          </p:cNvPr>
+          <p:cNvSpPr>
+            <a:spLocks noGrp="1" noRot="1" noChangeAspect="1" noMove="1" noResize="1" noEditPoints="1" noAdjustHandles="1" noChangeArrowheads="1" noChangeShapeType="1" noTextEdit="1"/>
+          </p:cNvSpPr>
+          <p:nvPr>
+            <p:extLst>
+              <p:ext uri="{386F3935-93C4-4BCD-93E2-E3B085C9AB24}">
+                <p16:designElem xmlns:p16="http://schemas.microsoft.com/office/powerpoint/2015/main" val="1"/>
+              </p:ext>
+            </p:extLst>
+          </p:nvPr>
+        </p:nvSpPr>
+        <p:spPr>
+          <a:xfrm>
+            <a:off x="0" y="0"/>
+            <a:ext cx="12188952" cy="6858000"/>
+          </a:xfrm>
+          <a:prstGeom prst="rect">
+            <a:avLst/>
+          </a:prstGeom>
+          <a:ln>
+            <a:noFill/>
+          </a:ln>
+        </p:spPr>
+        <p:style>
+          <a:lnRef idx="2">
+            <a:schemeClr val="accent1">
+              <a:shade val="50000"/>
+            </a:schemeClr>
+          </a:lnRef>
+          <a:fillRef idx="1">
+            <a:schemeClr val="accent1"/>
+          </a:fillRef>
+          <a:effectRef idx="0">
+            <a:schemeClr val="accent1"/>
+          </a:effectRef>
+          <a:fontRef idx="minor">
+            <a:schemeClr val="lt1"/>
+          </a:fontRef>
+        </p:style>
+        <p:txBody>
+          <a:bodyPr rtlCol="0" anchor="ctr"/>
+          <a:lstStyle/>
+          <a:p>
+            <a:pPr algn="ctr"/>
+            <a:endParaRPr lang="en-US"/>
+          </a:p>
+        </p:txBody>
+      </p:sp>
+      <p:sp>
+        <p:nvSpPr>
+          <p:cNvPr id="6" name="TextBox 5">
+            <a:extLst>
+              <a:ext uri="{FF2B5EF4-FFF2-40B4-BE49-F238E27FC236}">
+                <a16:creationId xmlns:a16="http://schemas.microsoft.com/office/drawing/2014/main" id="{76D58722-D51A-B6F2-DC47-64477AA48D0D}"/>
+              </a:ext>
+            </a:extLst>
+          </p:cNvPr>
+          <p:cNvSpPr txBox="1"/>
+          <p:nvPr/>
+        </p:nvSpPr>
+        <p:spPr>
+          <a:xfrm>
+            <a:off x="771095" y="851228"/>
+            <a:ext cx="8118625" cy="830997"/>
+          </a:xfrm>
+          <a:prstGeom prst="rect">
+            <a:avLst/>
+          </a:prstGeom>
+          <a:noFill/>
+        </p:spPr>
+        <p:txBody>
+          <a:bodyPr wrap="square" rtlCol="0">
+            <a:spAutoFit/>
+          </a:bodyPr>
+          <a:lstStyle/>
+          <a:p>
+            <a:r>
+              <a:rPr lang="en-US" sz="4800" dirty="0">
+                <a:solidFill>
+                  <a:schemeClr val="accent2"/>
+                </a:solidFill>
+                <a:latin typeface="Roboto Black" panose="02000000000000000000" pitchFamily="2" charset="0"/>
+                <a:ea typeface="Roboto Black" panose="02000000000000000000" pitchFamily="2" charset="0"/>
+              </a:rPr>
+              <a:t>Queue&lt;T&gt;</a:t>
+            </a:r>
+          </a:p>
+        </p:txBody>
+      </p:sp>
+      <p:sp>
+        <p:nvSpPr>
+          <p:cNvPr id="7" name="TextBox 6">
+            <a:extLst>
+              <a:ext uri="{FF2B5EF4-FFF2-40B4-BE49-F238E27FC236}">
+                <a16:creationId xmlns:a16="http://schemas.microsoft.com/office/drawing/2014/main" id="{9BD9E820-B6AD-E4FB-234E-9B4B5499B0A1}"/>
+              </a:ext>
+            </a:extLst>
+          </p:cNvPr>
+          <p:cNvSpPr txBox="1"/>
+          <p:nvPr/>
+        </p:nvSpPr>
+        <p:spPr>
+          <a:xfrm>
+            <a:off x="792227" y="1754346"/>
+            <a:ext cx="5196099" cy="2800767"/>
+          </a:xfrm>
+          <a:prstGeom prst="rect">
+            <a:avLst/>
+          </a:prstGeom>
+          <a:noFill/>
+        </p:spPr>
+        <p:txBody>
+          <a:bodyPr wrap="square" rtlCol="0">
+            <a:spAutoFit/>
+          </a:bodyPr>
+          <a:lstStyle/>
+          <a:p>
+            <a:r>
+              <a:rPr lang="en-US" sz="1600" dirty="0">
+                <a:latin typeface="-apple-system"/>
+                <a:ea typeface="Roboto" panose="02000000000000000000" pitchFamily="2" charset="0"/>
+              </a:rPr>
+              <a:t>A Queue is a </a:t>
+            </a:r>
+            <a:r>
+              <a:rPr lang="en-US" sz="1600" b="1" dirty="0">
+                <a:solidFill>
+                  <a:schemeClr val="accent5"/>
+                </a:solidFill>
+                <a:latin typeface="-apple-system"/>
+                <a:ea typeface="Roboto" panose="02000000000000000000" pitchFamily="2" charset="0"/>
+              </a:rPr>
+              <a:t>FIFO (First-In, First-Out)</a:t>
+            </a:r>
+            <a:r>
+              <a:rPr lang="en-US" sz="1600" dirty="0">
+                <a:latin typeface="-apple-system"/>
+                <a:ea typeface="Roboto" panose="02000000000000000000" pitchFamily="2" charset="0"/>
+              </a:rPr>
+              <a:t> data structure that stores elements in the order they were added. </a:t>
+            </a:r>
+          </a:p>
+          <a:p>
+            <a:r>
+              <a:rPr lang="en-US" sz="1600" dirty="0">
+                <a:latin typeface="-apple-system"/>
+                <a:ea typeface="Roboto" panose="02000000000000000000" pitchFamily="2" charset="0"/>
+              </a:rPr>
+              <a:t>This means that the </a:t>
+            </a:r>
+            <a:r>
+              <a:rPr lang="en-US" sz="1600" u="sng" dirty="0">
+                <a:latin typeface="-apple-system"/>
+                <a:ea typeface="Roboto" panose="02000000000000000000" pitchFamily="2" charset="0"/>
+              </a:rPr>
+              <a:t>first element added </a:t>
+            </a:r>
+            <a:r>
+              <a:rPr lang="en-US" sz="1600" dirty="0">
+                <a:latin typeface="-apple-system"/>
+                <a:ea typeface="Roboto" panose="02000000000000000000" pitchFamily="2" charset="0"/>
+              </a:rPr>
+              <a:t>to the queue will be </a:t>
+            </a:r>
+            <a:r>
+              <a:rPr lang="en-US" sz="1600" u="sng" dirty="0">
+                <a:latin typeface="-apple-system"/>
+                <a:ea typeface="Roboto" panose="02000000000000000000" pitchFamily="2" charset="0"/>
+              </a:rPr>
+              <a:t>the first one removed</a:t>
+            </a:r>
+            <a:r>
+              <a:rPr lang="en-US" sz="1600" dirty="0">
+                <a:latin typeface="-apple-system"/>
+                <a:ea typeface="Roboto" panose="02000000000000000000" pitchFamily="2" charset="0"/>
+              </a:rPr>
+              <a:t>.</a:t>
+            </a:r>
+          </a:p>
+          <a:p>
+            <a:endParaRPr lang="en-US" sz="1600" b="1" dirty="0">
+              <a:latin typeface="-apple-system"/>
+              <a:ea typeface="Roboto" panose="02000000000000000000" pitchFamily="2" charset="0"/>
+            </a:endParaRPr>
+          </a:p>
+          <a:p>
+            <a:endParaRPr lang="en-US" sz="1600" b="1" dirty="0">
+              <a:latin typeface="-apple-system"/>
+              <a:ea typeface="Roboto" panose="02000000000000000000" pitchFamily="2" charset="0"/>
+            </a:endParaRPr>
+          </a:p>
+          <a:p>
+            <a:endParaRPr lang="en-US" sz="1600" b="1" dirty="0">
+              <a:latin typeface="-apple-system"/>
+              <a:ea typeface="Roboto" panose="02000000000000000000" pitchFamily="2" charset="0"/>
+            </a:endParaRPr>
+          </a:p>
+          <a:p>
+            <a:r>
+              <a:rPr lang="en-US" sz="1600" b="1" dirty="0">
+                <a:latin typeface="-apple-system"/>
+                <a:ea typeface="Roboto" panose="02000000000000000000" pitchFamily="2" charset="0"/>
+              </a:rPr>
+              <a:t>Properties and Methods</a:t>
+            </a:r>
+          </a:p>
+          <a:p>
+            <a:pPr marL="285750" indent="-285750">
+              <a:buFont typeface="Arial" panose="020B0604020202020204" pitchFamily="34" charset="0"/>
+              <a:buChar char="•"/>
+            </a:pPr>
+            <a:endParaRPr lang="en-US" sz="1600" b="1" dirty="0">
+              <a:latin typeface="-apple-system"/>
+              <a:ea typeface="Roboto" panose="02000000000000000000" pitchFamily="2" charset="0"/>
+            </a:endParaRPr>
+          </a:p>
+          <a:p>
+            <a:pPr marL="285750" indent="-285750">
+              <a:buFont typeface="Arial" panose="020B0604020202020204" pitchFamily="34" charset="0"/>
+              <a:buChar char="•"/>
+            </a:pPr>
+            <a:endParaRPr lang="en-US" sz="1600" dirty="0">
+              <a:latin typeface="-apple-system"/>
+              <a:ea typeface="Roboto" panose="02000000000000000000" pitchFamily="2" charset="0"/>
+            </a:endParaRPr>
+          </a:p>
+          <a:p>
+            <a:pPr marL="285750" indent="-285750">
+              <a:buFont typeface="Arial" panose="020B0604020202020204" pitchFamily="34" charset="0"/>
+              <a:buChar char="•"/>
+            </a:pPr>
+            <a:endParaRPr lang="en-US" sz="1600" dirty="0">
+              <a:latin typeface="-apple-system"/>
+              <a:ea typeface="Roboto" panose="02000000000000000000" pitchFamily="2" charset="0"/>
+            </a:endParaRPr>
+          </a:p>
+        </p:txBody>
+      </p:sp>
+      <p:graphicFrame>
+        <p:nvGraphicFramePr>
+          <p:cNvPr id="2" name="Table 1">
+            <a:extLst>
+              <a:ext uri="{FF2B5EF4-FFF2-40B4-BE49-F238E27FC236}">
+                <a16:creationId xmlns:a16="http://schemas.microsoft.com/office/drawing/2014/main" id="{19061E3A-EF8B-1B0B-5DFA-56FA839A2968}"/>
+              </a:ext>
+            </a:extLst>
+          </p:cNvPr>
+          <p:cNvGraphicFramePr>
+            <a:graphicFrameLocks noGrp="1"/>
+          </p:cNvGraphicFramePr>
+          <p:nvPr>
+            <p:extLst>
+              <p:ext uri="{D42A27DB-BD31-4B8C-83A1-F6EECF244321}">
+                <p14:modId xmlns:p14="http://schemas.microsoft.com/office/powerpoint/2010/main" val="2321116095"/>
+              </p:ext>
+            </p:extLst>
+          </p:nvPr>
+        </p:nvGraphicFramePr>
+        <p:xfrm>
+          <a:off x="792226" y="3781844"/>
+          <a:ext cx="10604500" cy="2249606"/>
+        </p:xfrm>
+        <a:graphic>
+          <a:graphicData uri="http://schemas.openxmlformats.org/drawingml/2006/table">
+            <a:tbl>
+              <a:tblPr firstRow="1" bandRow="1">
+                <a:tableStyleId>{5C22544A-7EE6-4342-B048-85BDC9FD1C3A}</a:tableStyleId>
+              </a:tblPr>
+              <a:tblGrid>
+                <a:gridCol w="5302250">
+                  <a:extLst>
+                    <a:ext uri="{9D8B030D-6E8A-4147-A177-3AD203B41FA5}">
+                      <a16:colId xmlns:a16="http://schemas.microsoft.com/office/drawing/2014/main" val="3479775401"/>
+                    </a:ext>
+                  </a:extLst>
+                </a:gridCol>
+                <a:gridCol w="5302250">
+                  <a:extLst>
+                    <a:ext uri="{9D8B030D-6E8A-4147-A177-3AD203B41FA5}">
+                      <a16:colId xmlns:a16="http://schemas.microsoft.com/office/drawing/2014/main" val="954773244"/>
+                    </a:ext>
+                  </a:extLst>
+                </a:gridCol>
+              </a:tblGrid>
+              <a:tr h="296714">
+                <a:tc>
+                  <a:txBody>
+                    <a:bodyPr/>
+                    <a:lstStyle/>
+                    <a:p>
+                      <a:r>
+                        <a:rPr lang="en-US" sz="1400" dirty="0">
+                          <a:latin typeface="Roboto" panose="02000000000000000000" pitchFamily="2" charset="0"/>
+                          <a:ea typeface="Roboto" panose="02000000000000000000" pitchFamily="2" charset="0"/>
+                        </a:rPr>
+                        <a:t>Property / Method</a:t>
+                      </a:r>
+                    </a:p>
+                  </a:txBody>
+                  <a:tcPr/>
+                </a:tc>
+                <a:tc>
+                  <a:txBody>
+                    <a:bodyPr/>
+                    <a:lstStyle/>
+                    <a:p>
+                      <a:r>
+                        <a:rPr lang="en-US" sz="1400" dirty="0">
+                          <a:latin typeface="Roboto" panose="02000000000000000000" pitchFamily="2" charset="0"/>
+                          <a:ea typeface="Roboto" panose="02000000000000000000" pitchFamily="2" charset="0"/>
+                        </a:rPr>
+                        <a:t>Description</a:t>
+                      </a:r>
+                    </a:p>
+                  </a:txBody>
+                  <a:tcPr/>
+                </a:tc>
+                <a:extLst>
+                  <a:ext uri="{0D108BD9-81ED-4DB2-BD59-A6C34878D82A}">
+                    <a16:rowId xmlns:a16="http://schemas.microsoft.com/office/drawing/2014/main" val="412094397"/>
+                  </a:ext>
+                </a:extLst>
+              </a:tr>
+              <a:tr h="454243">
+                <a:tc>
+                  <a:txBody>
+                    <a:bodyPr/>
+                    <a:lstStyle/>
+                    <a:p>
+                      <a:r>
+                        <a:rPr lang="en-US" sz="1400" b="1" dirty="0">
+                          <a:latin typeface="Roboto" panose="02000000000000000000" pitchFamily="2" charset="0"/>
+                          <a:ea typeface="Roboto" panose="02000000000000000000" pitchFamily="2" charset="0"/>
+                        </a:rPr>
+                        <a:t>Count</a:t>
+                      </a:r>
+                    </a:p>
+                  </a:txBody>
+                  <a:tcPr/>
+                </a:tc>
+                <a:tc>
+                  <a:txBody>
+                    <a:bodyPr/>
+                    <a:lstStyle/>
+                    <a:p>
+                      <a:r>
+                        <a:rPr lang="en-US" sz="1400" dirty="0">
+                          <a:latin typeface="Roboto" panose="02000000000000000000" pitchFamily="2" charset="0"/>
+                          <a:ea typeface="Roboto" panose="02000000000000000000" pitchFamily="2" charset="0"/>
+                        </a:rPr>
+                        <a:t>Gets the number of elements in the queue.</a:t>
+                      </a:r>
+                    </a:p>
+                  </a:txBody>
+                  <a:tcPr/>
+                </a:tc>
+                <a:extLst>
+                  <a:ext uri="{0D108BD9-81ED-4DB2-BD59-A6C34878D82A}">
+                    <a16:rowId xmlns:a16="http://schemas.microsoft.com/office/drawing/2014/main" val="3203117005"/>
+                  </a:ext>
+                </a:extLst>
+              </a:tr>
+              <a:tr h="454243">
+                <a:tc>
+                  <a:txBody>
+                    <a:bodyPr/>
+                    <a:lstStyle/>
+                    <a:p>
+                      <a:r>
+                        <a:rPr lang="en-US" sz="1400" b="1" dirty="0">
+                          <a:latin typeface="Roboto" panose="02000000000000000000" pitchFamily="2" charset="0"/>
+                          <a:ea typeface="Roboto" panose="02000000000000000000" pitchFamily="2" charset="0"/>
+                        </a:rPr>
+                        <a:t>Clear()</a:t>
+                      </a:r>
+                    </a:p>
+                  </a:txBody>
+                  <a:tcPr/>
+                </a:tc>
+                <a:tc>
+                  <a:txBody>
+                    <a:bodyPr/>
+                    <a:lstStyle/>
+                    <a:p>
+                      <a:r>
+                        <a:rPr lang="en-US" sz="1400" dirty="0">
+                          <a:latin typeface="Roboto" panose="02000000000000000000" pitchFamily="2" charset="0"/>
+                          <a:ea typeface="Roboto" panose="02000000000000000000" pitchFamily="2" charset="0"/>
+                        </a:rPr>
+                        <a:t>Removes all elements from the queue.</a:t>
+                      </a:r>
+                    </a:p>
+                  </a:txBody>
+                  <a:tcPr/>
+                </a:tc>
+                <a:extLst>
+                  <a:ext uri="{0D108BD9-81ED-4DB2-BD59-A6C34878D82A}">
+                    <a16:rowId xmlns:a16="http://schemas.microsoft.com/office/drawing/2014/main" val="1108414833"/>
+                  </a:ext>
+                </a:extLst>
+              </a:tr>
+              <a:tr h="454243">
+                <a:tc>
+                  <a:txBody>
+                    <a:bodyPr/>
+                    <a:lstStyle/>
+                    <a:p>
+                      <a:r>
+                        <a:rPr lang="en-US" sz="1400" b="1" dirty="0">
+                          <a:latin typeface="Roboto" panose="02000000000000000000" pitchFamily="2" charset="0"/>
+                          <a:ea typeface="Roboto" panose="02000000000000000000" pitchFamily="2" charset="0"/>
+                        </a:rPr>
+                        <a:t>Contains(</a:t>
+                      </a:r>
+                      <a:r>
+                        <a:rPr lang="en-US" sz="1400" b="0" dirty="0">
+                          <a:latin typeface="Roboto" panose="02000000000000000000" pitchFamily="2" charset="0"/>
+                          <a:ea typeface="Roboto" panose="02000000000000000000" pitchFamily="2" charset="0"/>
+                        </a:rPr>
+                        <a:t>T item</a:t>
+                      </a:r>
+                      <a:r>
+                        <a:rPr lang="en-US" sz="1400" b="1" dirty="0">
+                          <a:latin typeface="Roboto" panose="02000000000000000000" pitchFamily="2" charset="0"/>
+                          <a:ea typeface="Roboto" panose="02000000000000000000" pitchFamily="2" charset="0"/>
+                        </a:rPr>
+                        <a:t>)</a:t>
+                      </a:r>
+                    </a:p>
+                  </a:txBody>
+                  <a:tcPr/>
+                </a:tc>
+                <a:tc>
+                  <a:txBody>
+                    <a:bodyPr/>
+                    <a:lstStyle/>
+                    <a:p>
+                      <a:r>
+                        <a:rPr lang="en-US" sz="1400" dirty="0">
+                          <a:latin typeface="Roboto" panose="02000000000000000000" pitchFamily="2" charset="0"/>
+                          <a:ea typeface="Roboto" panose="02000000000000000000" pitchFamily="2" charset="0"/>
+                        </a:rPr>
+                        <a:t>Checks if the specified item exists in the queue and returns true or false.</a:t>
+                      </a:r>
+                    </a:p>
+                  </a:txBody>
+                  <a:tcPr/>
+                </a:tc>
+                <a:extLst>
+                  <a:ext uri="{0D108BD9-81ED-4DB2-BD59-A6C34878D82A}">
+                    <a16:rowId xmlns:a16="http://schemas.microsoft.com/office/drawing/2014/main" val="3710949462"/>
+                  </a:ext>
+                </a:extLst>
+              </a:tr>
+              <a:tr h="504414">
+                <a:tc>
+                  <a:txBody>
+                    <a:bodyPr/>
+                    <a:lstStyle/>
+                    <a:p>
+                      <a:r>
+                        <a:rPr lang="en-US" sz="1400" b="1" dirty="0" err="1">
+                          <a:latin typeface="Roboto" panose="02000000000000000000" pitchFamily="2" charset="0"/>
+                          <a:ea typeface="Roboto" panose="02000000000000000000" pitchFamily="2" charset="0"/>
+                        </a:rPr>
+                        <a:t>CopyTo</a:t>
+                      </a:r>
+                      <a:r>
+                        <a:rPr lang="en-US" sz="1400" b="1" dirty="0">
+                          <a:latin typeface="Roboto" panose="02000000000000000000" pitchFamily="2" charset="0"/>
+                          <a:ea typeface="Roboto" panose="02000000000000000000" pitchFamily="2" charset="0"/>
+                        </a:rPr>
+                        <a:t>(</a:t>
+                      </a:r>
+                      <a:r>
+                        <a:rPr lang="en-US" sz="1400" b="0" dirty="0">
+                          <a:latin typeface="Roboto" panose="02000000000000000000" pitchFamily="2" charset="0"/>
+                          <a:ea typeface="Roboto" panose="02000000000000000000" pitchFamily="2" charset="0"/>
+                        </a:rPr>
+                        <a:t>T [ ] array, int index</a:t>
+                      </a:r>
+                      <a:r>
+                        <a:rPr lang="en-US" sz="1400" b="1" dirty="0">
+                          <a:latin typeface="Roboto" panose="02000000000000000000" pitchFamily="2" charset="0"/>
+                          <a:ea typeface="Roboto" panose="02000000000000000000" pitchFamily="2" charset="0"/>
+                        </a:rPr>
+                        <a:t>)</a:t>
+                      </a:r>
+                    </a:p>
+                  </a:txBody>
+                  <a:tcPr/>
+                </a:tc>
+                <a:tc>
+                  <a:txBody>
+                    <a:bodyPr/>
+                    <a:lstStyle/>
+                    <a:p>
+                      <a:r>
+                        <a:rPr lang="en-US" sz="1400" dirty="0">
+                          <a:latin typeface="Roboto" panose="02000000000000000000" pitchFamily="2" charset="0"/>
+                          <a:ea typeface="Roboto" panose="02000000000000000000" pitchFamily="2" charset="0"/>
+                        </a:rPr>
+                        <a:t>Copies the queue elements to an existing array starting at the specified index.</a:t>
+                      </a:r>
+                    </a:p>
+                  </a:txBody>
+                  <a:tcPr/>
+                </a:tc>
+                <a:extLst>
+                  <a:ext uri="{0D108BD9-81ED-4DB2-BD59-A6C34878D82A}">
+                    <a16:rowId xmlns:a16="http://schemas.microsoft.com/office/drawing/2014/main" val="677495998"/>
+                  </a:ext>
+                </a:extLst>
+              </a:tr>
+            </a:tbl>
+          </a:graphicData>
+        </a:graphic>
+      </p:graphicFrame>
+      <p:pic>
+        <p:nvPicPr>
+          <p:cNvPr id="12" name="Picture 11">
+            <a:extLst>
+              <a:ext uri="{FF2B5EF4-FFF2-40B4-BE49-F238E27FC236}">
+                <a16:creationId xmlns:a16="http://schemas.microsoft.com/office/drawing/2014/main" id="{E9510601-1DE5-42ED-20AC-776299FA721C}"/>
+              </a:ext>
+            </a:extLst>
+          </p:cNvPr>
+          <p:cNvPicPr>
+            <a:picLocks noChangeAspect="1"/>
+          </p:cNvPicPr>
+          <p:nvPr/>
+        </p:nvPicPr>
+        <p:blipFill>
+          <a:blip r:embed="rId2"/>
+          <a:stretch>
+            <a:fillRect/>
+          </a:stretch>
+        </p:blipFill>
+        <p:spPr>
+          <a:xfrm>
+            <a:off x="5988326" y="1442673"/>
+            <a:ext cx="5850775" cy="1784812"/>
+          </a:xfrm>
+          <a:prstGeom prst="rect">
+            <a:avLst/>
+          </a:prstGeom>
+        </p:spPr>
+      </p:pic>
+    </p:spTree>
+    <p:extLst>
+      <p:ext uri="{BB962C8B-B14F-4D97-AF65-F5344CB8AC3E}">
+        <p14:creationId xmlns:p14="http://schemas.microsoft.com/office/powerpoint/2010/main" val="3390100794"/>
+      </p:ext>
+    </p:extLst>
+  </p:cSld>
+  <p:clrMapOvr>
+    <a:masterClrMapping/>
+  </p:clrMapOvr>
+</p:sld>
+</file>
+
+<file path=ppt/slides/slide16.xml><?xml version="1.0" encoding="utf-8"?>
+<p:sld xmlns:a="http://schemas.openxmlformats.org/drawingml/2006/main" xmlns:r="http://schemas.openxmlformats.org/officeDocument/2006/relationships" xmlns:p="http://schemas.openxmlformats.org/presentationml/2006/main">
+  <p:cSld>
+    <p:bg>
+      <p:bgPr>
+        <a:solidFill>
+          <a:schemeClr val="bg1"/>
+        </a:solidFill>
+        <a:effectLst/>
+      </p:bgPr>
+    </p:bg>
+    <p:spTree>
+      <p:nvGrpSpPr>
+        <p:cNvPr id="1" name="">
+          <a:extLst>
+            <a:ext uri="{FF2B5EF4-FFF2-40B4-BE49-F238E27FC236}">
+              <a16:creationId xmlns:a16="http://schemas.microsoft.com/office/drawing/2014/main" id="{DB9A4FDA-506F-7D6E-23A7-FD7AC9DF4376}"/>
+            </a:ext>
+          </a:extLst>
+        </p:cNvPr>
+        <p:cNvGrpSpPr/>
+        <p:nvPr/>
+      </p:nvGrpSpPr>
+      <p:grpSpPr>
+        <a:xfrm>
+          <a:off x="0" y="0"/>
+          <a:ext cx="0" cy="0"/>
+          <a:chOff x="0" y="0"/>
+          <a:chExt cx="0" cy="0"/>
+        </a:xfrm>
+      </p:grpSpPr>
+      <p:sp useBgFill="1">
+        <p:nvSpPr>
+          <p:cNvPr id="10" name="Rectangle 9">
+            <a:extLst>
+              <a:ext uri="{FF2B5EF4-FFF2-40B4-BE49-F238E27FC236}">
+                <a16:creationId xmlns:a16="http://schemas.microsoft.com/office/drawing/2014/main" id="{55AF2BD7-4592-3038-E78E-5F6763DFBA1F}"/>
+              </a:ext>
+              <a:ext uri="{C183D7F6-B498-43B3-948B-1728B52AA6E4}">
+                <adec:decorative xmlns:adec="http://schemas.microsoft.com/office/drawing/2017/decorative" val="1"/>
+              </a:ext>
+            </a:extLst>
+          </p:cNvPr>
+          <p:cNvSpPr>
+            <a:spLocks noGrp="1" noRot="1" noChangeAspect="1" noMove="1" noResize="1" noEditPoints="1" noAdjustHandles="1" noChangeArrowheads="1" noChangeShapeType="1" noTextEdit="1"/>
+          </p:cNvSpPr>
+          <p:nvPr>
+            <p:extLst>
+              <p:ext uri="{386F3935-93C4-4BCD-93E2-E3B085C9AB24}">
+                <p16:designElem xmlns:p16="http://schemas.microsoft.com/office/powerpoint/2015/main" val="1"/>
+              </p:ext>
+            </p:extLst>
+          </p:nvPr>
+        </p:nvSpPr>
+        <p:spPr>
+          <a:xfrm>
+            <a:off x="0" y="0"/>
+            <a:ext cx="12188952" cy="6858000"/>
+          </a:xfrm>
+          <a:prstGeom prst="rect">
+            <a:avLst/>
+          </a:prstGeom>
+          <a:ln>
+            <a:noFill/>
+          </a:ln>
+        </p:spPr>
+        <p:style>
+          <a:lnRef idx="2">
+            <a:schemeClr val="accent1">
+              <a:shade val="50000"/>
+            </a:schemeClr>
+          </a:lnRef>
+          <a:fillRef idx="1">
+            <a:schemeClr val="accent1"/>
+          </a:fillRef>
+          <a:effectRef idx="0">
+            <a:schemeClr val="accent1"/>
+          </a:effectRef>
+          <a:fontRef idx="minor">
+            <a:schemeClr val="lt1"/>
+          </a:fontRef>
+        </p:style>
+        <p:txBody>
+          <a:bodyPr rtlCol="0" anchor="ctr"/>
+          <a:lstStyle/>
+          <a:p>
+            <a:pPr algn="ctr"/>
+            <a:endParaRPr lang="en-US"/>
+          </a:p>
+        </p:txBody>
+      </p:sp>
+      <p:graphicFrame>
+        <p:nvGraphicFramePr>
+          <p:cNvPr id="2" name="Table 1">
+            <a:extLst>
+              <a:ext uri="{FF2B5EF4-FFF2-40B4-BE49-F238E27FC236}">
+                <a16:creationId xmlns:a16="http://schemas.microsoft.com/office/drawing/2014/main" id="{E101279E-8D81-51E3-C94F-0A0788BF05BB}"/>
+              </a:ext>
+            </a:extLst>
+          </p:cNvPr>
+          <p:cNvGraphicFramePr>
+            <a:graphicFrameLocks noGrp="1"/>
+          </p:cNvGraphicFramePr>
+          <p:nvPr>
+            <p:extLst>
+              <p:ext uri="{D42A27DB-BD31-4B8C-83A1-F6EECF244321}">
+                <p14:modId xmlns:p14="http://schemas.microsoft.com/office/powerpoint/2010/main" val="127150834"/>
+              </p:ext>
+            </p:extLst>
+          </p:nvPr>
+        </p:nvGraphicFramePr>
+        <p:xfrm>
+          <a:off x="792226" y="2107003"/>
+          <a:ext cx="10604500" cy="2199788"/>
+        </p:xfrm>
+        <a:graphic>
+          <a:graphicData uri="http://schemas.openxmlformats.org/drawingml/2006/table">
+            <a:tbl>
+              <a:tblPr firstRow="1" bandRow="1">
+                <a:tableStyleId>{5C22544A-7EE6-4342-B048-85BDC9FD1C3A}</a:tableStyleId>
+              </a:tblPr>
+              <a:tblGrid>
+                <a:gridCol w="5302250">
+                  <a:extLst>
+                    <a:ext uri="{9D8B030D-6E8A-4147-A177-3AD203B41FA5}">
+                      <a16:colId xmlns:a16="http://schemas.microsoft.com/office/drawing/2014/main" val="3479775401"/>
+                    </a:ext>
+                  </a:extLst>
+                </a:gridCol>
+                <a:gridCol w="5302250">
+                  <a:extLst>
+                    <a:ext uri="{9D8B030D-6E8A-4147-A177-3AD203B41FA5}">
+                      <a16:colId xmlns:a16="http://schemas.microsoft.com/office/drawing/2014/main" val="954773244"/>
+                    </a:ext>
+                  </a:extLst>
+                </a:gridCol>
+              </a:tblGrid>
+              <a:tr h="282506">
+                <a:tc>
+                  <a:txBody>
+                    <a:bodyPr/>
+                    <a:lstStyle/>
+                    <a:p>
+                      <a:r>
+                        <a:rPr lang="en-US" sz="1400" dirty="0">
+                          <a:latin typeface="Roboto" panose="02000000000000000000" pitchFamily="2" charset="0"/>
+                          <a:ea typeface="Roboto" panose="02000000000000000000" pitchFamily="2" charset="0"/>
+                        </a:rPr>
+                        <a:t>Property / Method</a:t>
+                      </a:r>
+                    </a:p>
+                  </a:txBody>
+                  <a:tcPr/>
+                </a:tc>
+                <a:tc>
+                  <a:txBody>
+                    <a:bodyPr/>
+                    <a:lstStyle/>
+                    <a:p>
+                      <a:r>
+                        <a:rPr lang="en-US" sz="1400" dirty="0">
+                          <a:latin typeface="Roboto" panose="02000000000000000000" pitchFamily="2" charset="0"/>
+                          <a:ea typeface="Roboto" panose="02000000000000000000" pitchFamily="2" charset="0"/>
+                        </a:rPr>
+                        <a:t>Description</a:t>
+                      </a:r>
+                    </a:p>
+                  </a:txBody>
+                  <a:tcPr/>
+                </a:tc>
+                <a:extLst>
+                  <a:ext uri="{0D108BD9-81ED-4DB2-BD59-A6C34878D82A}">
+                    <a16:rowId xmlns:a16="http://schemas.microsoft.com/office/drawing/2014/main" val="412094397"/>
+                  </a:ext>
+                </a:extLst>
+              </a:tr>
+              <a:tr h="416306">
+                <a:tc>
+                  <a:txBody>
+                    <a:bodyPr/>
+                    <a:lstStyle/>
+                    <a:p>
+                      <a:r>
+                        <a:rPr lang="en-US" sz="1400" b="1" dirty="0">
+                          <a:latin typeface="Roboto" panose="02000000000000000000" pitchFamily="2" charset="0"/>
+                          <a:ea typeface="Roboto" panose="02000000000000000000" pitchFamily="2" charset="0"/>
+                        </a:rPr>
+                        <a:t>Enqueue</a:t>
+                      </a:r>
+                      <a:r>
+                        <a:rPr lang="en-US" sz="1400" b="0" dirty="0">
+                          <a:latin typeface="Roboto" panose="02000000000000000000" pitchFamily="2" charset="0"/>
+                          <a:ea typeface="Roboto" panose="02000000000000000000" pitchFamily="2" charset="0"/>
+                        </a:rPr>
+                        <a:t>(T item)</a:t>
+                      </a:r>
+                    </a:p>
+                  </a:txBody>
+                  <a:tcPr/>
+                </a:tc>
+                <a:tc>
+                  <a:txBody>
+                    <a:bodyPr/>
+                    <a:lstStyle/>
+                    <a:p>
+                      <a:r>
+                        <a:rPr lang="en-US" sz="1400" dirty="0">
+                          <a:latin typeface="Roboto" panose="02000000000000000000" pitchFamily="2" charset="0"/>
+                          <a:ea typeface="Roboto" panose="02000000000000000000" pitchFamily="2" charset="0"/>
+                        </a:rPr>
+                        <a:t>Adds an item to the end of the queue.</a:t>
+                      </a:r>
+                    </a:p>
+                  </a:txBody>
+                  <a:tcPr/>
+                </a:tc>
+                <a:extLst>
+                  <a:ext uri="{0D108BD9-81ED-4DB2-BD59-A6C34878D82A}">
+                    <a16:rowId xmlns:a16="http://schemas.microsoft.com/office/drawing/2014/main" val="890513449"/>
+                  </a:ext>
+                </a:extLst>
+              </a:tr>
+              <a:tr h="480261">
+                <a:tc>
+                  <a:txBody>
+                    <a:bodyPr/>
+                    <a:lstStyle/>
+                    <a:p>
+                      <a:r>
+                        <a:rPr lang="en-US" sz="1400" b="1" dirty="0">
+                          <a:latin typeface="Roboto" panose="02000000000000000000" pitchFamily="2" charset="0"/>
+                          <a:ea typeface="Roboto" panose="02000000000000000000" pitchFamily="2" charset="0"/>
+                        </a:rPr>
+                        <a:t>Dequeue()</a:t>
+                      </a:r>
+                    </a:p>
+                  </a:txBody>
+                  <a:tcPr/>
+                </a:tc>
+                <a:tc>
+                  <a:txBody>
+                    <a:bodyPr/>
+                    <a:lstStyle/>
+                    <a:p>
+                      <a:r>
+                        <a:rPr lang="en-US" sz="1400" dirty="0">
+                          <a:latin typeface="Roboto" panose="02000000000000000000" pitchFamily="2" charset="0"/>
+                          <a:ea typeface="Roboto" panose="02000000000000000000" pitchFamily="2" charset="0"/>
+                        </a:rPr>
+                        <a:t>Removes and returns the item at the front of the queue. </a:t>
+                      </a:r>
+                    </a:p>
+                  </a:txBody>
+                  <a:tcPr/>
+                </a:tc>
+                <a:extLst>
+                  <a:ext uri="{0D108BD9-81ED-4DB2-BD59-A6C34878D82A}">
+                    <a16:rowId xmlns:a16="http://schemas.microsoft.com/office/drawing/2014/main" val="3203117005"/>
+                  </a:ext>
+                </a:extLst>
+              </a:tr>
+              <a:tr h="480261">
+                <a:tc>
+                  <a:txBody>
+                    <a:bodyPr/>
+                    <a:lstStyle/>
+                    <a:p>
+                      <a:r>
+                        <a:rPr lang="en-US" sz="1400" b="1" dirty="0">
+                          <a:latin typeface="Roboto" panose="02000000000000000000" pitchFamily="2" charset="0"/>
+                          <a:ea typeface="Roboto" panose="02000000000000000000" pitchFamily="2" charset="0"/>
+                        </a:rPr>
+                        <a:t>Peek()</a:t>
+                      </a:r>
+                    </a:p>
+                  </a:txBody>
+                  <a:tcPr/>
+                </a:tc>
+                <a:tc>
+                  <a:txBody>
+                    <a:bodyPr/>
+                    <a:lstStyle/>
+                    <a:p>
+                      <a:r>
+                        <a:rPr lang="en-US" sz="1400" dirty="0">
+                          <a:latin typeface="Roboto" panose="02000000000000000000" pitchFamily="2" charset="0"/>
+                          <a:ea typeface="Roboto" panose="02000000000000000000" pitchFamily="2" charset="0"/>
+                        </a:rPr>
+                        <a:t>Returns the item at the front of the queue without removing it.</a:t>
+                      </a:r>
+                    </a:p>
+                  </a:txBody>
+                  <a:tcPr/>
+                </a:tc>
+                <a:extLst>
+                  <a:ext uri="{0D108BD9-81ED-4DB2-BD59-A6C34878D82A}">
+                    <a16:rowId xmlns:a16="http://schemas.microsoft.com/office/drawing/2014/main" val="1108414833"/>
+                  </a:ext>
+                </a:extLst>
+              </a:tr>
+              <a:tr h="480261">
+                <a:tc>
+                  <a:txBody>
+                    <a:bodyPr/>
+                    <a:lstStyle/>
+                    <a:p>
+                      <a:r>
+                        <a:rPr lang="en-US" sz="1400" b="1" dirty="0" err="1">
+                          <a:latin typeface="Roboto" panose="02000000000000000000" pitchFamily="2" charset="0"/>
+                          <a:ea typeface="Roboto" panose="02000000000000000000" pitchFamily="2" charset="0"/>
+                        </a:rPr>
+                        <a:t>ToArray</a:t>
+                      </a:r>
+                      <a:r>
+                        <a:rPr lang="en-US" sz="1400" b="1" dirty="0">
+                          <a:latin typeface="Roboto" panose="02000000000000000000" pitchFamily="2" charset="0"/>
+                          <a:ea typeface="Roboto" panose="02000000000000000000" pitchFamily="2" charset="0"/>
+                        </a:rPr>
+                        <a:t>()</a:t>
+                      </a:r>
+                    </a:p>
+                  </a:txBody>
+                  <a:tcPr/>
+                </a:tc>
+                <a:tc>
+                  <a:txBody>
+                    <a:bodyPr/>
+                    <a:lstStyle/>
+                    <a:p>
+                      <a:r>
+                        <a:rPr lang="en-US" sz="1400" dirty="0">
+                          <a:latin typeface="Roboto" panose="02000000000000000000" pitchFamily="2" charset="0"/>
+                          <a:ea typeface="Roboto" panose="02000000000000000000" pitchFamily="2" charset="0"/>
+                        </a:rPr>
+                        <a:t>Copies the elements of the queue into a new array without modifying the queue.</a:t>
+                      </a:r>
+                    </a:p>
+                  </a:txBody>
+                  <a:tcPr/>
+                </a:tc>
+                <a:extLst>
+                  <a:ext uri="{0D108BD9-81ED-4DB2-BD59-A6C34878D82A}">
+                    <a16:rowId xmlns:a16="http://schemas.microsoft.com/office/drawing/2014/main" val="3710949462"/>
+                  </a:ext>
+                </a:extLst>
+              </a:tr>
+            </a:tbl>
+          </a:graphicData>
+        </a:graphic>
+      </p:graphicFrame>
+    </p:spTree>
+    <p:extLst>
+      <p:ext uri="{BB962C8B-B14F-4D97-AF65-F5344CB8AC3E}">
+        <p14:creationId xmlns:p14="http://schemas.microsoft.com/office/powerpoint/2010/main" val="1379263428"/>
+      </p:ext>
+    </p:extLst>
+  </p:cSld>
+  <p:clrMapOvr>
+    <a:masterClrMapping/>
+  </p:clrMapOvr>
+</p:sld>
+</file>
+
+<file path=ppt/slides/slide17.xml><?xml version="1.0" encoding="utf-8"?>
+<p:sld xmlns:a="http://schemas.openxmlformats.org/drawingml/2006/main" xmlns:r="http://schemas.openxmlformats.org/officeDocument/2006/relationships" xmlns:p="http://schemas.openxmlformats.org/presentationml/2006/main">
+  <p:cSld>
+    <p:bg>
+      <p:bgPr>
+        <a:solidFill>
+          <a:schemeClr val="bg1"/>
+        </a:solidFill>
+        <a:effectLst/>
+      </p:bgPr>
+    </p:bg>
+    <p:spTree>
+      <p:nvGrpSpPr>
+        <p:cNvPr id="1" name="">
+          <a:extLst>
+            <a:ext uri="{FF2B5EF4-FFF2-40B4-BE49-F238E27FC236}">
               <a16:creationId xmlns:a16="http://schemas.microsoft.com/office/drawing/2014/main" id="{CA027C80-BB25-95AB-6463-A07D97166EAB}"/>
             </a:ext>
           </a:extLst>
@@ -8958,6 +12279,9 @@
             </a:r>
             <a:r>
               <a:rPr lang="en-US" sz="1600" u="sng" dirty="0">
+                <a:solidFill>
+                  <a:schemeClr val="accent5"/>
+                </a:solidFill>
                 <a:latin typeface="-apple-system"/>
                 <a:ea typeface="Roboto" panose="02000000000000000000" pitchFamily="2" charset="0"/>
               </a:rPr>
@@ -8991,6 +12315,9 @@
             </a:r>
             <a:r>
               <a:rPr lang="en-US" sz="1600" u="sng" dirty="0">
+                <a:solidFill>
+                  <a:schemeClr val="accent5"/>
+                </a:solidFill>
                 <a:latin typeface="-apple-system"/>
                 <a:ea typeface="Roboto" panose="02000000000000000000" pitchFamily="2" charset="0"/>
               </a:rPr>

</xml_diff>